<commit_message>
removing all print stuff from code
</commit_message>
<xml_diff>
--- a/Final_Presentation.pptx
+++ b/Final_Presentation.pptx
@@ -249,7 +249,7 @@
           <a:p>
             <a:fld id="{C789233F-1DD4-405C-B30E-AE056EEBB0C2}" type="datetimeFigureOut">
               <a:rPr lang="en-CA" smtClean="0"/>
-              <a:t>31/12/2014</a:t>
+              <a:t>03/01/2015</a:t>
             </a:fld>
             <a:endParaRPr lang="en-CA"/>
           </a:p>
@@ -562,7 +562,7 @@
           <a:p>
             <a:fld id="{C789233F-1DD4-405C-B30E-AE056EEBB0C2}" type="datetimeFigureOut">
               <a:rPr lang="en-CA" smtClean="0"/>
-              <a:t>31/12/2014</a:t>
+              <a:t>03/01/2015</a:t>
             </a:fld>
             <a:endParaRPr lang="en-CA"/>
           </a:p>
@@ -747,7 +747,7 @@
           <a:p>
             <a:fld id="{C789233F-1DD4-405C-B30E-AE056EEBB0C2}" type="datetimeFigureOut">
               <a:rPr lang="en-CA" smtClean="0"/>
-              <a:t>31/12/2014</a:t>
+              <a:t>03/01/2015</a:t>
             </a:fld>
             <a:endParaRPr lang="en-CA"/>
           </a:p>
@@ -922,7 +922,7 @@
           <a:p>
             <a:fld id="{C789233F-1DD4-405C-B30E-AE056EEBB0C2}" type="datetimeFigureOut">
               <a:rPr lang="en-CA" smtClean="0"/>
-              <a:t>31/12/2014</a:t>
+              <a:t>03/01/2015</a:t>
             </a:fld>
             <a:endParaRPr lang="en-CA"/>
           </a:p>
@@ -1190,7 +1190,7 @@
           <a:p>
             <a:fld id="{C789233F-1DD4-405C-B30E-AE056EEBB0C2}" type="datetimeFigureOut">
               <a:rPr lang="en-CA" smtClean="0"/>
-              <a:t>31/12/2014</a:t>
+              <a:t>03/01/2015</a:t>
             </a:fld>
             <a:endParaRPr lang="en-CA"/>
           </a:p>
@@ -1658,7 +1658,7 @@
           <a:p>
             <a:fld id="{C789233F-1DD4-405C-B30E-AE056EEBB0C2}" type="datetimeFigureOut">
               <a:rPr lang="en-CA" smtClean="0"/>
-              <a:t>31/12/2014</a:t>
+              <a:t>03/01/2015</a:t>
             </a:fld>
             <a:endParaRPr lang="en-CA"/>
           </a:p>
@@ -2147,7 +2147,7 @@
           <a:p>
             <a:fld id="{C789233F-1DD4-405C-B30E-AE056EEBB0C2}" type="datetimeFigureOut">
               <a:rPr lang="en-CA" smtClean="0"/>
-              <a:t>31/12/2014</a:t>
+              <a:t>03/01/2015</a:t>
             </a:fld>
             <a:endParaRPr lang="en-CA"/>
           </a:p>
@@ -2273,7 +2273,7 @@
           <a:p>
             <a:fld id="{C789233F-1DD4-405C-B30E-AE056EEBB0C2}" type="datetimeFigureOut">
               <a:rPr lang="en-CA" smtClean="0"/>
-              <a:t>31/12/2014</a:t>
+              <a:t>03/01/2015</a:t>
             </a:fld>
             <a:endParaRPr lang="en-CA"/>
           </a:p>
@@ -2417,7 +2417,7 @@
           <a:p>
             <a:fld id="{C789233F-1DD4-405C-B30E-AE056EEBB0C2}" type="datetimeFigureOut">
               <a:rPr lang="en-CA" smtClean="0"/>
-              <a:t>31/12/2014</a:t>
+              <a:t>03/01/2015</a:t>
             </a:fld>
             <a:endParaRPr lang="en-CA"/>
           </a:p>
@@ -2739,7 +2739,7 @@
           <a:p>
             <a:fld id="{C789233F-1DD4-405C-B30E-AE056EEBB0C2}" type="datetimeFigureOut">
               <a:rPr lang="en-CA" smtClean="0"/>
-              <a:t>31/12/2014</a:t>
+              <a:t>03/01/2015</a:t>
             </a:fld>
             <a:endParaRPr lang="en-CA"/>
           </a:p>
@@ -2873,7 +2873,7 @@
           <a:p>
             <a:fld id="{C789233F-1DD4-405C-B30E-AE056EEBB0C2}" type="datetimeFigureOut">
               <a:rPr lang="en-CA" smtClean="0"/>
-              <a:t>31/12/2014</a:t>
+              <a:t>03/01/2015</a:t>
             </a:fld>
             <a:endParaRPr lang="en-CA"/>
           </a:p>
@@ -3654,7 +3654,7 @@
           <a:p>
             <a:fld id="{C789233F-1DD4-405C-B30E-AE056EEBB0C2}" type="datetimeFigureOut">
               <a:rPr lang="en-CA" smtClean="0"/>
-              <a:t>31/12/2014</a:t>
+              <a:t>03/01/2015</a:t>
             </a:fld>
             <a:endParaRPr lang="en-CA"/>
           </a:p>
@@ -4948,14 +4948,14 @@
           <p:nvPr>
             <p:extLst>
               <p:ext uri="{D42A27DB-BD31-4B8C-83A1-F6EECF244321}">
-                <p14:modId xmlns:p14="http://schemas.microsoft.com/office/powerpoint/2010/main" val="2846257906"/>
+                <p14:modId xmlns:p14="http://schemas.microsoft.com/office/powerpoint/2010/main" val="2531373017"/>
               </p:ext>
             </p:extLst>
           </p:nvPr>
         </p:nvGraphicFramePr>
         <p:xfrm>
-          <a:off x="6074715" y="4509121"/>
-          <a:ext cx="2817765" cy="1584174"/>
+          <a:off x="6156176" y="4522177"/>
+          <a:ext cx="2304256" cy="1584174"/>
         </p:xfrm>
         <a:graphic>
           <a:graphicData uri="http://schemas.openxmlformats.org/drawingml/2006/table">
@@ -4964,9 +4964,9 @@
                 <a:tableStyleId>{073A0DAA-6AF3-43AB-8588-CEC1D06C72B9}</a:tableStyleId>
               </a:tblPr>
               <a:tblGrid>
-                <a:gridCol w="729533"/>
-                <a:gridCol w="720080"/>
-                <a:gridCol w="1368152"/>
+                <a:gridCol w="585517"/>
+                <a:gridCol w="648072"/>
+                <a:gridCol w="1070667"/>
               </a:tblGrid>
               <a:tr h="528058">
                 <a:tc>
@@ -5270,7 +5270,7 @@
                             </p:stCondLst>
                             <p:childTnLst>
                               <p:par>
-                                <p:cTn id="5" presetID="42" presetClass="entr" presetSubtype="0" fill="hold" grpId="0" nodeType="clickEffect">
+                                <p:cTn id="5" presetID="6" presetClass="entr" presetSubtype="16" fill="hold" grpId="0" nodeType="clickEffect">
                                   <p:stCondLst>
                                     <p:cond delay="0"/>
                                   </p:stCondLst>
@@ -5293,60 +5293,14 @@
                                         <p:strVal val="visible"/>
                                       </p:to>
                                     </p:set>
-                                    <p:animEffect transition="in" filter="fade">
+                                    <p:animEffect transition="in" filter="circle(in)">
                                       <p:cBhvr>
-                                        <p:cTn id="7" dur="1000"/>
+                                        <p:cTn id="7" dur="2000"/>
                                         <p:tgtEl>
                                           <p:spTgt spid="10"/>
                                         </p:tgtEl>
                                       </p:cBhvr>
                                     </p:animEffect>
-                                    <p:anim calcmode="lin" valueType="num">
-                                      <p:cBhvr>
-                                        <p:cTn id="8" dur="1000" fill="hold"/>
-                                        <p:tgtEl>
-                                          <p:spTgt spid="10"/>
-                                        </p:tgtEl>
-                                        <p:attrNameLst>
-                                          <p:attrName>ppt_x</p:attrName>
-                                        </p:attrNameLst>
-                                      </p:cBhvr>
-                                      <p:tavLst>
-                                        <p:tav tm="0">
-                                          <p:val>
-                                            <p:strVal val="#ppt_x"/>
-                                          </p:val>
-                                        </p:tav>
-                                        <p:tav tm="100000">
-                                          <p:val>
-                                            <p:strVal val="#ppt_x"/>
-                                          </p:val>
-                                        </p:tav>
-                                      </p:tavLst>
-                                    </p:anim>
-                                    <p:anim calcmode="lin" valueType="num">
-                                      <p:cBhvr>
-                                        <p:cTn id="9" dur="1000" fill="hold"/>
-                                        <p:tgtEl>
-                                          <p:spTgt spid="10"/>
-                                        </p:tgtEl>
-                                        <p:attrNameLst>
-                                          <p:attrName>ppt_y</p:attrName>
-                                        </p:attrNameLst>
-                                      </p:cBhvr>
-                                      <p:tavLst>
-                                        <p:tav tm="0">
-                                          <p:val>
-                                            <p:strVal val="#ppt_y+.1"/>
-                                          </p:val>
-                                        </p:tav>
-                                        <p:tav tm="100000">
-                                          <p:val>
-                                            <p:strVal val="#ppt_y"/>
-                                          </p:val>
-                                        </p:tav>
-                                      </p:tavLst>
-                                    </p:anim>
                                   </p:childTnLst>
                                 </p:cTn>
                               </p:par>
@@ -5357,26 +5311,26 @@
                     </p:cTn>
                   </p:par>
                   <p:par>
-                    <p:cTn id="10" fill="hold">
+                    <p:cTn id="8" fill="hold">
                       <p:stCondLst>
                         <p:cond delay="indefinite"/>
                       </p:stCondLst>
                       <p:childTnLst>
                         <p:par>
-                          <p:cTn id="11" fill="hold">
+                          <p:cTn id="9" fill="hold">
                             <p:stCondLst>
                               <p:cond delay="0"/>
                             </p:stCondLst>
                             <p:childTnLst>
                               <p:par>
-                                <p:cTn id="12" presetID="42" presetClass="entr" presetSubtype="0" fill="hold" grpId="0" nodeType="clickEffect">
+                                <p:cTn id="10" presetID="42" presetClass="entr" presetSubtype="0" fill="hold" grpId="0" nodeType="clickEffect">
                                   <p:stCondLst>
                                     <p:cond delay="0"/>
                                   </p:stCondLst>
                                   <p:childTnLst>
                                     <p:set>
                                       <p:cBhvr>
-                                        <p:cTn id="13" dur="1" fill="hold">
+                                        <p:cTn id="11" dur="1" fill="hold">
                                           <p:stCondLst>
                                             <p:cond delay="0"/>
                                           </p:stCondLst>
@@ -5394,7 +5348,7 @@
                                     </p:set>
                                     <p:animEffect transition="in" filter="fade">
                                       <p:cBhvr>
-                                        <p:cTn id="14" dur="1000"/>
+                                        <p:cTn id="12" dur="1000"/>
                                         <p:tgtEl>
                                           <p:spTgt spid="13"/>
                                         </p:tgtEl>
@@ -5402,7 +5356,7 @@
                                     </p:animEffect>
                                     <p:anim calcmode="lin" valueType="num">
                                       <p:cBhvr>
-                                        <p:cTn id="15" dur="1000" fill="hold"/>
+                                        <p:cTn id="13" dur="1000" fill="hold"/>
                                         <p:tgtEl>
                                           <p:spTgt spid="13"/>
                                         </p:tgtEl>
@@ -5425,7 +5379,7 @@
                                     </p:anim>
                                     <p:anim calcmode="lin" valueType="num">
                                       <p:cBhvr>
-                                        <p:cTn id="16" dur="1000" fill="hold"/>
+                                        <p:cTn id="14" dur="1000" fill="hold"/>
                                         <p:tgtEl>
                                           <p:spTgt spid="13"/>
                                         </p:tgtEl>
@@ -5456,26 +5410,26 @@
                     </p:cTn>
                   </p:par>
                   <p:par>
-                    <p:cTn id="17" fill="hold">
+                    <p:cTn id="15" fill="hold">
                       <p:stCondLst>
                         <p:cond delay="indefinite"/>
                       </p:stCondLst>
                       <p:childTnLst>
                         <p:par>
-                          <p:cTn id="18" fill="hold">
+                          <p:cTn id="16" fill="hold">
                             <p:stCondLst>
                               <p:cond delay="0"/>
                             </p:stCondLst>
                             <p:childTnLst>
                               <p:par>
-                                <p:cTn id="19" presetID="42" presetClass="entr" presetSubtype="0" fill="hold" nodeType="clickEffect">
+                                <p:cTn id="17" presetID="42" presetClass="entr" presetSubtype="0" fill="hold" nodeType="clickEffect">
                                   <p:stCondLst>
                                     <p:cond delay="0"/>
                                   </p:stCondLst>
                                   <p:childTnLst>
                                     <p:set>
                                       <p:cBhvr>
-                                        <p:cTn id="20" dur="1" fill="hold">
+                                        <p:cTn id="18" dur="1" fill="hold">
                                           <p:stCondLst>
                                             <p:cond delay="0"/>
                                           </p:stCondLst>
@@ -5493,7 +5447,7 @@
                                     </p:set>
                                     <p:animEffect transition="in" filter="fade">
                                       <p:cBhvr>
-                                        <p:cTn id="21" dur="1000"/>
+                                        <p:cTn id="19" dur="1000"/>
                                         <p:tgtEl>
                                           <p:spTgt spid="14"/>
                                         </p:tgtEl>
@@ -5501,7 +5455,7 @@
                                     </p:animEffect>
                                     <p:anim calcmode="lin" valueType="num">
                                       <p:cBhvr>
-                                        <p:cTn id="22" dur="1000" fill="hold"/>
+                                        <p:cTn id="20" dur="1000" fill="hold"/>
                                         <p:tgtEl>
                                           <p:spTgt spid="14"/>
                                         </p:tgtEl>
@@ -5524,7 +5478,7 @@
                                     </p:anim>
                                     <p:anim calcmode="lin" valueType="num">
                                       <p:cBhvr>
-                                        <p:cTn id="23" dur="1000" fill="hold"/>
+                                        <p:cTn id="21" dur="1000" fill="hold"/>
                                         <p:tgtEl>
                                           <p:spTgt spid="14"/>
                                         </p:tgtEl>
@@ -5555,26 +5509,26 @@
                     </p:cTn>
                   </p:par>
                   <p:par>
-                    <p:cTn id="24" fill="hold">
+                    <p:cTn id="22" fill="hold">
                       <p:stCondLst>
                         <p:cond delay="indefinite"/>
                       </p:stCondLst>
                       <p:childTnLst>
                         <p:par>
-                          <p:cTn id="25" fill="hold">
+                          <p:cTn id="23" fill="hold">
                             <p:stCondLst>
                               <p:cond delay="0"/>
                             </p:stCondLst>
                             <p:childTnLst>
                               <p:par>
-                                <p:cTn id="26" presetID="42" presetClass="entr" presetSubtype="0" fill="hold" grpId="0" nodeType="clickEffect">
+                                <p:cTn id="24" presetID="6" presetClass="entr" presetSubtype="16" fill="hold" grpId="0" nodeType="clickEffect">
                                   <p:stCondLst>
                                     <p:cond delay="0"/>
                                   </p:stCondLst>
                                   <p:childTnLst>
                                     <p:set>
                                       <p:cBhvr>
-                                        <p:cTn id="27" dur="1" fill="hold">
+                                        <p:cTn id="25" dur="1" fill="hold">
                                           <p:stCondLst>
                                             <p:cond delay="0"/>
                                           </p:stCondLst>
@@ -5590,19 +5544,72 @@
                                         <p:strVal val="visible"/>
                                       </p:to>
                                     </p:set>
-                                    <p:animEffect transition="in" filter="fade">
+                                    <p:animEffect transition="in" filter="circle(in)">
                                       <p:cBhvr>
-                                        <p:cTn id="28" dur="1000"/>
+                                        <p:cTn id="26" dur="2000"/>
                                         <p:tgtEl>
                                           <p:spTgt spid="16"/>
                                         </p:tgtEl>
                                       </p:cBhvr>
                                     </p:animEffect>
+                                  </p:childTnLst>
+                                </p:cTn>
+                              </p:par>
+                            </p:childTnLst>
+                          </p:cTn>
+                        </p:par>
+                      </p:childTnLst>
+                    </p:cTn>
+                  </p:par>
+                  <p:par>
+                    <p:cTn id="27" fill="hold">
+                      <p:stCondLst>
+                        <p:cond delay="indefinite"/>
+                      </p:stCondLst>
+                      <p:childTnLst>
+                        <p:par>
+                          <p:cTn id="28" fill="hold">
+                            <p:stCondLst>
+                              <p:cond delay="0"/>
+                            </p:stCondLst>
+                            <p:childTnLst>
+                              <p:par>
+                                <p:cTn id="29" presetID="42" presetClass="entr" presetSubtype="0" fill="hold" grpId="0" nodeType="clickEffect">
+                                  <p:stCondLst>
+                                    <p:cond delay="0"/>
+                                  </p:stCondLst>
+                                  <p:childTnLst>
+                                    <p:set>
+                                      <p:cBhvr>
+                                        <p:cTn id="30" dur="1" fill="hold">
+                                          <p:stCondLst>
+                                            <p:cond delay="0"/>
+                                          </p:stCondLst>
+                                        </p:cTn>
+                                        <p:tgtEl>
+                                          <p:spTgt spid="22"/>
+                                        </p:tgtEl>
+                                        <p:attrNameLst>
+                                          <p:attrName>style.visibility</p:attrName>
+                                        </p:attrNameLst>
+                                      </p:cBhvr>
+                                      <p:to>
+                                        <p:strVal val="visible"/>
+                                      </p:to>
+                                    </p:set>
+                                    <p:animEffect transition="in" filter="fade">
+                                      <p:cBhvr>
+                                        <p:cTn id="31" dur="1000"/>
+                                        <p:tgtEl>
+                                          <p:spTgt spid="22"/>
+                                        </p:tgtEl>
+                                      </p:cBhvr>
+                                    </p:animEffect>
                                     <p:anim calcmode="lin" valueType="num">
                                       <p:cBhvr>
-                                        <p:cTn id="29" dur="1000" fill="hold"/>
+                                        <p:cTn id="32" dur="1000" fill="hold"/>
                                         <p:tgtEl>
-                                          <p:spTgt spid="16"/>
+                                          <p:spTgt spid="22"/>
                                         </p:tgtEl>
                                         <p:attrNameLst>
                                           <p:attrName>ppt_x</p:attrName>
@@ -5623,9 +5630,9 @@
                                     </p:anim>
                                     <p:anim calcmode="lin" valueType="num">
                                       <p:cBhvr>
-                                        <p:cTn id="30" dur="1000" fill="hold"/>
+                                        <p:cTn id="33" dur="1000" fill="hold"/>
                                         <p:tgtEl>
-                                          <p:spTgt spid="16"/>
+                                          <p:spTgt spid="22"/>
                                         </p:tgtEl>
                                         <p:attrNameLst>
                                           <p:attrName>ppt_y</p:attrName>
@@ -5654,26 +5661,26 @@
                     </p:cTn>
                   </p:par>
                   <p:par>
-                    <p:cTn id="31" fill="hold">
+                    <p:cTn id="34" fill="hold">
                       <p:stCondLst>
                         <p:cond delay="indefinite"/>
                       </p:stCondLst>
                       <p:childTnLst>
                         <p:par>
-                          <p:cTn id="32" fill="hold">
+                          <p:cTn id="35" fill="hold">
                             <p:stCondLst>
                               <p:cond delay="0"/>
                             </p:stCondLst>
                             <p:childTnLst>
                               <p:par>
-                                <p:cTn id="33" presetID="42" presetClass="entr" presetSubtype="0" fill="hold" nodeType="clickEffect">
+                                <p:cTn id="36" presetID="42" presetClass="entr" presetSubtype="0" fill="hold" nodeType="clickEffect">
                                   <p:stCondLst>
                                     <p:cond delay="0"/>
                                   </p:stCondLst>
                                   <p:childTnLst>
                                     <p:set>
                                       <p:cBhvr>
-                                        <p:cTn id="34" dur="1" fill="hold">
+                                        <p:cTn id="37" dur="1" fill="hold">
                                           <p:stCondLst>
                                             <p:cond delay="0"/>
                                           </p:stCondLst>
@@ -5691,7 +5698,7 @@
                                     </p:set>
                                     <p:animEffect transition="in" filter="fade">
                                       <p:cBhvr>
-                                        <p:cTn id="35" dur="1000"/>
+                                        <p:cTn id="38" dur="1000"/>
                                         <p:tgtEl>
                                           <p:spTgt spid="17"/>
                                         </p:tgtEl>
@@ -5699,7 +5706,7 @@
                                     </p:animEffect>
                                     <p:anim calcmode="lin" valueType="num">
                                       <p:cBhvr>
-                                        <p:cTn id="36" dur="1000" fill="hold"/>
+                                        <p:cTn id="39" dur="1000" fill="hold"/>
                                         <p:tgtEl>
                                           <p:spTgt spid="17"/>
                                         </p:tgtEl>
@@ -5722,7 +5729,7 @@
                                     </p:anim>
                                     <p:anim calcmode="lin" valueType="num">
                                       <p:cBhvr>
-                                        <p:cTn id="37" dur="1000" fill="hold"/>
+                                        <p:cTn id="40" dur="1000" fill="hold"/>
                                         <p:tgtEl>
                                           <p:spTgt spid="17"/>
                                         </p:tgtEl>
@@ -5777,6 +5784,7 @@
       <p:bldP spid="10" grpId="0" animBg="1"/>
       <p:bldP spid="13" grpId="0"/>
       <p:bldP spid="16" grpId="0" animBg="1"/>
+      <p:bldP spid="22" grpId="0"/>
     </p:bldLst>
   </p:timing>
 </p:sld>
@@ -5839,13 +5847,13 @@
           <p:nvPr>
             <p:extLst>
               <p:ext uri="{D42A27DB-BD31-4B8C-83A1-F6EECF244321}">
-                <p14:modId xmlns:p14="http://schemas.microsoft.com/office/powerpoint/2010/main" val="696496062"/>
+                <p14:modId xmlns:p14="http://schemas.microsoft.com/office/powerpoint/2010/main" val="1104105335"/>
               </p:ext>
             </p:extLst>
           </p:nvPr>
         </p:nvGraphicFramePr>
         <p:xfrm>
-          <a:off x="1524001" y="1412776"/>
+          <a:off x="1538980" y="1287344"/>
           <a:ext cx="2615952" cy="1445420"/>
         </p:xfrm>
         <a:graphic>
@@ -6015,13 +6023,13 @@
                     <a:p>
                       <a:pPr algn="ctr" fontAlgn="b"/>
                       <a:r>
-                        <a:rPr lang="en-CA" sz="1600" b="0" u="none" strike="noStrike">
+                        <a:rPr lang="en-CA" sz="1600" b="0" u="none" strike="noStrike" dirty="0">
                           <a:effectLst/>
                           <a:latin typeface="Calibri" panose="020F0502020204030204" pitchFamily="34" charset="0"/>
                         </a:rPr>
                         <a:t>3</a:t>
                       </a:r>
-                      <a:endParaRPr lang="en-CA" sz="1600" b="0" i="0" u="none" strike="noStrike">
+                      <a:endParaRPr lang="en-CA" sz="1600" b="0" i="0" u="none" strike="noStrike" dirty="0">
                         <a:solidFill>
                           <a:srgbClr val="000000"/>
                         </a:solidFill>
@@ -6207,14 +6215,14 @@
           <p:nvPr>
             <p:extLst>
               <p:ext uri="{D42A27DB-BD31-4B8C-83A1-F6EECF244321}">
-                <p14:modId xmlns:p14="http://schemas.microsoft.com/office/powerpoint/2010/main" val="2389678743"/>
+                <p14:modId xmlns:p14="http://schemas.microsoft.com/office/powerpoint/2010/main" val="3764533794"/>
               </p:ext>
             </p:extLst>
           </p:nvPr>
         </p:nvGraphicFramePr>
         <p:xfrm>
-          <a:off x="5688122" y="1287344"/>
-          <a:ext cx="2664294" cy="1756790"/>
+          <a:off x="5688121" y="1287344"/>
+          <a:ext cx="2664294" cy="1521023"/>
         </p:xfrm>
         <a:graphic>
           <a:graphicData uri="http://schemas.openxmlformats.org/drawingml/2006/table">
@@ -6301,7 +6309,7 @@
                   <a:tcPr marL="9525" marR="9525" marT="9525" marB="0" anchor="b"/>
                 </a:tc>
               </a:tr>
-              <a:tr h="351358">
+              <a:tr h="278130">
                 <a:tc>
                   <a:txBody>
                     <a:bodyPr/>
@@ -6362,6 +6370,80 @@
                           <a:latin typeface="Calibri" panose="020F0502020204030204" pitchFamily="34" charset="0"/>
                         </a:rPr>
                         <a:t>9</a:t>
+                      </a:r>
+                      <a:endParaRPr lang="en-CA" sz="1600" b="0" i="0" u="none" strike="noStrike">
+                        <a:solidFill>
+                          <a:srgbClr val="000000"/>
+                        </a:solidFill>
+                        <a:effectLst/>
+                        <a:latin typeface="Calibri" panose="020F0502020204030204" pitchFamily="34" charset="0"/>
+                      </a:endParaRPr>
+                    </a:p>
+                  </a:txBody>
+                  <a:tcPr marL="9525" marR="9525" marT="9525" marB="0" anchor="b"/>
+                </a:tc>
+              </a:tr>
+              <a:tr h="286812">
+                <a:tc>
+                  <a:txBody>
+                    <a:bodyPr/>
+                    <a:lstStyle/>
+                    <a:p>
+                      <a:pPr algn="ctr" fontAlgn="b"/>
+                      <a:r>
+                        <a:rPr lang="en-CA" sz="1600" u="none" strike="noStrike" dirty="0">
+                          <a:effectLst/>
+                          <a:latin typeface="Calibri" panose="020F0502020204030204" pitchFamily="34" charset="0"/>
+                        </a:rPr>
+                        <a:t>7</a:t>
+                      </a:r>
+                      <a:endParaRPr lang="en-CA" sz="1600" b="0" i="0" u="none" strike="noStrike" dirty="0">
+                        <a:solidFill>
+                          <a:srgbClr val="000000"/>
+                        </a:solidFill>
+                        <a:effectLst/>
+                        <a:latin typeface="Calibri" panose="020F0502020204030204" pitchFamily="34" charset="0"/>
+                      </a:endParaRPr>
+                    </a:p>
+                  </a:txBody>
+                  <a:tcPr marL="9525" marR="9525" marT="9525" marB="0" anchor="b"/>
+                </a:tc>
+                <a:tc>
+                  <a:txBody>
+                    <a:bodyPr/>
+                    <a:lstStyle/>
+                    <a:p>
+                      <a:pPr algn="ctr" fontAlgn="b"/>
+                      <a:r>
+                        <a:rPr lang="en-CA" sz="1600" u="none" strike="noStrike" dirty="0">
+                          <a:effectLst/>
+                          <a:latin typeface="Calibri" panose="020F0502020204030204" pitchFamily="34" charset="0"/>
+                        </a:rPr>
+                        <a:t>4</a:t>
+                      </a:r>
+                      <a:endParaRPr lang="en-CA" sz="1600" b="0" i="0" u="none" strike="noStrike" dirty="0">
+                        <a:solidFill>
+                          <a:srgbClr val="000000"/>
+                        </a:solidFill>
+                        <a:effectLst/>
+                        <a:latin typeface="Calibri" panose="020F0502020204030204" pitchFamily="34" charset="0"/>
+                      </a:endParaRPr>
+                    </a:p>
+                  </a:txBody>
+                  <a:tcPr marL="9525" marR="9525" marT="9525" marB="0" anchor="b"/>
+                </a:tc>
+                <a:tc>
+                  <a:txBody>
+                    <a:bodyPr/>
+                    <a:lstStyle/>
+                    <a:p>
+                      <a:pPr algn="ctr" fontAlgn="b"/>
+                      <a:r>
+                        <a:rPr lang="en-CA" sz="1600" u="none" strike="noStrike">
+                          <a:effectLst/>
+                          <a:latin typeface="Calibri" panose="020F0502020204030204" pitchFamily="34" charset="0"/>
+                        </a:rPr>
+                        <a:t>2</a:t>
                       </a:r>
                       <a:endParaRPr lang="en-CA" sz="1600" b="0" i="0" u="none" strike="noStrike">
                         <a:solidFill>
@@ -6383,11 +6465,35 @@
                     <a:p>
                       <a:pPr algn="ctr" fontAlgn="b"/>
                       <a:r>
+                        <a:rPr lang="en-CA" sz="1600" u="none" strike="noStrike">
+                          <a:effectLst/>
+                          <a:latin typeface="Calibri" panose="020F0502020204030204" pitchFamily="34" charset="0"/>
+                        </a:rPr>
+                        <a:t>2</a:t>
+                      </a:r>
+                      <a:endParaRPr lang="en-CA" sz="1600" b="0" i="0" u="none" strike="noStrike">
+                        <a:solidFill>
+                          <a:srgbClr val="000000"/>
+                        </a:solidFill>
+                        <a:effectLst/>
+                        <a:latin typeface="Calibri" panose="020F0502020204030204" pitchFamily="34" charset="0"/>
+                      </a:endParaRPr>
+                    </a:p>
+                  </a:txBody>
+                  <a:tcPr marL="9525" marR="9525" marT="9525" marB="0" anchor="b"/>
+                </a:tc>
+                <a:tc>
+                  <a:txBody>
+                    <a:bodyPr/>
+                    <a:lstStyle/>
+                    <a:p>
+                      <a:pPr algn="ctr" fontAlgn="b"/>
+                      <a:r>
                         <a:rPr lang="en-CA" sz="1600" u="none" strike="noStrike" dirty="0">
                           <a:effectLst/>
                           <a:latin typeface="Calibri" panose="020F0502020204030204" pitchFamily="34" charset="0"/>
                         </a:rPr>
-                        <a:t>7</a:t>
+                        <a:t>9</a:t>
                       </a:r>
                       <a:endParaRPr lang="en-CA" sz="1600" b="0" i="0" u="none" strike="noStrike" dirty="0">
                         <a:solidFill>
@@ -6411,7 +6517,7 @@
                           <a:effectLst/>
                           <a:latin typeface="Calibri" panose="020F0502020204030204" pitchFamily="34" charset="0"/>
                         </a:rPr>
-                        <a:t>4</a:t>
+                        <a:t>9</a:t>
                       </a:r>
                       <a:endParaRPr lang="en-CA" sz="1600" b="0" i="0" u="none" strike="noStrike" dirty="0">
                         <a:solidFill>
@@ -6424,56 +6530,8 @@
                   </a:txBody>
                   <a:tcPr marL="9525" marR="9525" marT="9525" marB="0" anchor="b"/>
                 </a:tc>
-                <a:tc>
-                  <a:txBody>
-                    <a:bodyPr/>
-                    <a:lstStyle/>
-                    <a:p>
-                      <a:pPr algn="ctr" fontAlgn="b"/>
-                      <a:r>
-                        <a:rPr lang="en-CA" sz="1600" u="none" strike="noStrike">
-                          <a:effectLst/>
-                          <a:latin typeface="Calibri" panose="020F0502020204030204" pitchFamily="34" charset="0"/>
-                        </a:rPr>
-                        <a:t>2</a:t>
-                      </a:r>
-                      <a:endParaRPr lang="en-CA" sz="1600" b="0" i="0" u="none" strike="noStrike">
-                        <a:solidFill>
-                          <a:srgbClr val="000000"/>
-                        </a:solidFill>
-                        <a:effectLst/>
-                        <a:latin typeface="Calibri" panose="020F0502020204030204" pitchFamily="34" charset="0"/>
-                      </a:endParaRPr>
-                    </a:p>
-                  </a:txBody>
-                  <a:tcPr marL="9525" marR="9525" marT="9525" marB="0" anchor="b"/>
-                </a:tc>
               </a:tr>
-              <a:tr h="351358">
-                <a:tc>
-                  <a:txBody>
-                    <a:bodyPr/>
-                    <a:lstStyle/>
-                    <a:p>
-                      <a:pPr algn="ctr" fontAlgn="b"/>
-                      <a:r>
-                        <a:rPr lang="en-CA" sz="1600" u="none" strike="noStrike">
-                          <a:effectLst/>
-                          <a:latin typeface="Calibri" panose="020F0502020204030204" pitchFamily="34" charset="0"/>
-                        </a:rPr>
-                        <a:t>2</a:t>
-                      </a:r>
-                      <a:endParaRPr lang="en-CA" sz="1600" b="0" i="0" u="none" strike="noStrike">
-                        <a:solidFill>
-                          <a:srgbClr val="000000"/>
-                        </a:solidFill>
-                        <a:effectLst/>
-                        <a:latin typeface="Calibri" panose="020F0502020204030204" pitchFamily="34" charset="0"/>
-                      </a:endParaRPr>
-                    </a:p>
-                  </a:txBody>
-                  <a:tcPr marL="9525" marR="9525" marT="9525" marB="0" anchor="b"/>
-                </a:tc>
+              <a:tr h="109348">
                 <a:tc>
                   <a:txBody>
                     <a:bodyPr/>
@@ -6485,59 +6543,9 @@
                           <a:effectLst/>
                           <a:latin typeface="Calibri" panose="020F0502020204030204" pitchFamily="34" charset="0"/>
                         </a:rPr>
-                        <a:t>9</a:t>
+                        <a:t>3</a:t>
                       </a:r>
                       <a:endParaRPr lang="en-CA" sz="1600" b="0" i="0" u="none" strike="noStrike" dirty="0">
-                        <a:solidFill>
-                          <a:srgbClr val="000000"/>
-                        </a:solidFill>
-                        <a:effectLst/>
-                        <a:latin typeface="Calibri" panose="020F0502020204030204" pitchFamily="34" charset="0"/>
-                      </a:endParaRPr>
-                    </a:p>
-                  </a:txBody>
-                  <a:tcPr marL="9525" marR="9525" marT="9525" marB="0" anchor="b"/>
-                </a:tc>
-                <a:tc>
-                  <a:txBody>
-                    <a:bodyPr/>
-                    <a:lstStyle/>
-                    <a:p>
-                      <a:pPr algn="ctr" fontAlgn="b"/>
-                      <a:r>
-                        <a:rPr lang="en-CA" sz="1600" u="none" strike="noStrike" dirty="0">
-                          <a:effectLst/>
-                          <a:latin typeface="Calibri" panose="020F0502020204030204" pitchFamily="34" charset="0"/>
-                        </a:rPr>
-                        <a:t>9</a:t>
-                      </a:r>
-                      <a:endParaRPr lang="en-CA" sz="1600" b="0" i="0" u="none" strike="noStrike" dirty="0">
-                        <a:solidFill>
-                          <a:srgbClr val="000000"/>
-                        </a:solidFill>
-                        <a:effectLst/>
-                        <a:latin typeface="Calibri" panose="020F0502020204030204" pitchFamily="34" charset="0"/>
-                      </a:endParaRPr>
-                    </a:p>
-                  </a:txBody>
-                  <a:tcPr marL="9525" marR="9525" marT="9525" marB="0" anchor="b"/>
-                </a:tc>
-              </a:tr>
-              <a:tr h="351358">
-                <a:tc>
-                  <a:txBody>
-                    <a:bodyPr/>
-                    <a:lstStyle/>
-                    <a:p>
-                      <a:pPr algn="ctr" fontAlgn="b"/>
-                      <a:r>
-                        <a:rPr lang="en-CA" sz="1600" u="none" strike="noStrike">
-                          <a:effectLst/>
-                          <a:latin typeface="Calibri" panose="020F0502020204030204" pitchFamily="34" charset="0"/>
-                        </a:rPr>
-                        <a:t>3</a:t>
-                      </a:r>
-                      <a:endParaRPr lang="en-CA" sz="1600" b="0" i="0" u="none" strike="noStrike">
                         <a:solidFill>
                           <a:srgbClr val="000000"/>
                         </a:solidFill>
@@ -6639,8 +6647,8 @@
         </p:nvSpPr>
         <p:spPr>
           <a:xfrm>
-            <a:off x="2051720" y="3321961"/>
-            <a:ext cx="2016224" cy="369332"/>
+            <a:off x="1538980" y="3825097"/>
+            <a:ext cx="1512168" cy="369332"/>
           </a:xfrm>
           <a:prstGeom prst="rect">
             <a:avLst/>
@@ -6686,14 +6694,14 @@
           <p:nvPr>
             <p:extLst>
               <p:ext uri="{D42A27DB-BD31-4B8C-83A1-F6EECF244321}">
-                <p14:modId xmlns:p14="http://schemas.microsoft.com/office/powerpoint/2010/main" val="2460182325"/>
+                <p14:modId xmlns:p14="http://schemas.microsoft.com/office/powerpoint/2010/main" val="3708548202"/>
               </p:ext>
             </p:extLst>
           </p:nvPr>
         </p:nvGraphicFramePr>
         <p:xfrm>
-          <a:off x="1259632" y="4221088"/>
-          <a:ext cx="3960440" cy="1536172"/>
+          <a:off x="1538980" y="4221088"/>
+          <a:ext cx="2717226" cy="1584176"/>
         </p:xfrm>
         <a:graphic>
           <a:graphicData uri="http://schemas.openxmlformats.org/drawingml/2006/table">
@@ -6702,13 +6710,12 @@
                 <a:tableStyleId>{073A0DAA-6AF3-43AB-8588-CEC1D06C72B9}</a:tableStyleId>
               </a:tblPr>
               <a:tblGrid>
-                <a:gridCol w="718745"/>
-                <a:gridCol w="576064"/>
-                <a:gridCol w="1224136"/>
-                <a:gridCol w="720080"/>
-                <a:gridCol w="721415"/>
+                <a:gridCol w="483063"/>
+                <a:gridCol w="422680"/>
+                <a:gridCol w="1206536"/>
+                <a:gridCol w="604947"/>
               </a:tblGrid>
-              <a:tr h="384043">
+              <a:tr h="396044">
                 <a:tc>
                   <a:txBody>
                     <a:bodyPr/>
@@ -6792,7 +6799,7 @@
                           <a:effectLst/>
                           <a:latin typeface="Calibri" panose="020F0502020204030204" pitchFamily="34" charset="0"/>
                         </a:rPr>
-                        <a:t>R_c</a:t>
+                        <a:t>R_d</a:t>
                       </a:r>
                       <a:endParaRPr lang="en-CA" sz="1600" b="0" i="0" u="none" strike="noStrike" dirty="0">
                         <a:solidFill>
@@ -6805,18 +6812,20 @@
                   </a:txBody>
                   <a:tcPr marL="9525" marR="9525" marT="9525" marB="0" anchor="b"/>
                 </a:tc>
-                <a:tc>
-                  <a:txBody>
-                    <a:bodyPr/>
-                    <a:lstStyle/>
-                    <a:p>
-                      <a:pPr algn="ctr" fontAlgn="b"/>
-                      <a:r>
-                        <a:rPr lang="en-CA" sz="1600" b="0" u="none" strike="noStrike" dirty="0" err="1" smtClean="0">
-                          <a:effectLst/>
-                          <a:latin typeface="Calibri" panose="020F0502020204030204" pitchFamily="34" charset="0"/>
-                        </a:rPr>
-                        <a:t>R_d</a:t>
+              </a:tr>
+              <a:tr h="396044">
+                <a:tc>
+                  <a:txBody>
+                    <a:bodyPr/>
+                    <a:lstStyle/>
+                    <a:p>
+                      <a:pPr algn="ctr" fontAlgn="b"/>
+                      <a:r>
+                        <a:rPr lang="en-CA" sz="1600" u="none" strike="noStrike" dirty="0">
+                          <a:effectLst/>
+                          <a:latin typeface="Calibri" panose="020F0502020204030204" pitchFamily="34" charset="0"/>
+                        </a:rPr>
+                        <a:t>3</a:t>
                       </a:r>
                       <a:endParaRPr lang="en-CA" sz="1600" b="0" i="0" u="none" strike="noStrike" dirty="0">
                         <a:solidFill>
@@ -6829,8 +6838,152 @@
                   </a:txBody>
                   <a:tcPr marL="9525" marR="9525" marT="9525" marB="0" anchor="b"/>
                 </a:tc>
+                <a:tc>
+                  <a:txBody>
+                    <a:bodyPr/>
+                    <a:lstStyle/>
+                    <a:p>
+                      <a:pPr algn="ctr" fontAlgn="b"/>
+                      <a:r>
+                        <a:rPr lang="en-CA" sz="1600" u="none" strike="noStrike" dirty="0">
+                          <a:effectLst/>
+                          <a:latin typeface="Calibri" panose="020F0502020204030204" pitchFamily="34" charset="0"/>
+                        </a:rPr>
+                        <a:t>9</a:t>
+                      </a:r>
+                      <a:endParaRPr lang="en-CA" sz="1600" b="0" i="0" u="none" strike="noStrike" dirty="0">
+                        <a:solidFill>
+                          <a:srgbClr val="000000"/>
+                        </a:solidFill>
+                        <a:effectLst/>
+                        <a:latin typeface="Calibri" panose="020F0502020204030204" pitchFamily="34" charset="0"/>
+                      </a:endParaRPr>
+                    </a:p>
+                  </a:txBody>
+                  <a:tcPr marL="9525" marR="9525" marT="9525" marB="0" anchor="b"/>
+                </a:tc>
+                <a:tc>
+                  <a:txBody>
+                    <a:bodyPr/>
+                    <a:lstStyle/>
+                    <a:p>
+                      <a:pPr algn="ctr" fontAlgn="b"/>
+                      <a:r>
+                        <a:rPr lang="en-CA" sz="1600" u="none" strike="noStrike" dirty="0">
+                          <a:effectLst/>
+                          <a:latin typeface="Calibri" panose="020F0502020204030204" pitchFamily="34" charset="0"/>
+                        </a:rPr>
+                        <a:t>84</a:t>
+                      </a:r>
+                      <a:endParaRPr lang="en-CA" sz="1600" b="0" i="0" u="none" strike="noStrike" dirty="0">
+                        <a:solidFill>
+                          <a:srgbClr val="000000"/>
+                        </a:solidFill>
+                        <a:effectLst/>
+                        <a:latin typeface="Calibri" panose="020F0502020204030204" pitchFamily="34" charset="0"/>
+                      </a:endParaRPr>
+                    </a:p>
+                  </a:txBody>
+                  <a:tcPr marL="9525" marR="9525" marT="9525" marB="0" anchor="b"/>
+                </a:tc>
+                <a:tc>
+                  <a:txBody>
+                    <a:bodyPr/>
+                    <a:lstStyle/>
+                    <a:p>
+                      <a:pPr algn="ctr" fontAlgn="b"/>
+                      <a:r>
+                        <a:rPr lang="en-CA" sz="1600" u="none" strike="noStrike" dirty="0">
+                          <a:effectLst/>
+                          <a:latin typeface="Calibri" panose="020F0502020204030204" pitchFamily="34" charset="0"/>
+                        </a:rPr>
+                        <a:t>9</a:t>
+                      </a:r>
+                      <a:endParaRPr lang="en-CA" sz="1600" b="0" i="0" u="none" strike="noStrike" dirty="0">
+                        <a:solidFill>
+                          <a:srgbClr val="000000"/>
+                        </a:solidFill>
+                        <a:effectLst/>
+                        <a:latin typeface="Calibri" panose="020F0502020204030204" pitchFamily="34" charset="0"/>
+                      </a:endParaRPr>
+                    </a:p>
+                  </a:txBody>
+                  <a:tcPr marL="9525" marR="9525" marT="9525" marB="0" anchor="b"/>
+                </a:tc>
               </a:tr>
-              <a:tr h="384043">
+              <a:tr h="396044">
+                <a:tc>
+                  <a:txBody>
+                    <a:bodyPr/>
+                    <a:lstStyle/>
+                    <a:p>
+                      <a:pPr algn="ctr" fontAlgn="b"/>
+                      <a:r>
+                        <a:rPr lang="en-CA" sz="1600" u="none" strike="noStrike">
+                          <a:effectLst/>
+                          <a:latin typeface="Calibri" panose="020F0502020204030204" pitchFamily="34" charset="0"/>
+                        </a:rPr>
+                        <a:t>2</a:t>
+                      </a:r>
+                      <a:endParaRPr lang="en-CA" sz="1600" b="0" i="0" u="none" strike="noStrike">
+                        <a:solidFill>
+                          <a:srgbClr val="000000"/>
+                        </a:solidFill>
+                        <a:effectLst/>
+                        <a:latin typeface="Calibri" panose="020F0502020204030204" pitchFamily="34" charset="0"/>
+                      </a:endParaRPr>
+                    </a:p>
+                  </a:txBody>
+                  <a:tcPr marL="9525" marR="9525" marT="9525" marB="0" anchor="b"/>
+                </a:tc>
+                <a:tc>
+                  <a:txBody>
+                    <a:bodyPr/>
+                    <a:lstStyle/>
+                    <a:p>
+                      <a:pPr algn="ctr" fontAlgn="b"/>
+                      <a:r>
+                        <a:rPr lang="en-CA" sz="1600" u="none" strike="noStrike">
+                          <a:effectLst/>
+                          <a:latin typeface="Calibri" panose="020F0502020204030204" pitchFamily="34" charset="0"/>
+                        </a:rPr>
+                        <a:t>6</a:t>
+                      </a:r>
+                      <a:endParaRPr lang="en-CA" sz="1600" b="0" i="0" u="none" strike="noStrike">
+                        <a:solidFill>
+                          <a:srgbClr val="000000"/>
+                        </a:solidFill>
+                        <a:effectLst/>
+                        <a:latin typeface="Calibri" panose="020F0502020204030204" pitchFamily="34" charset="0"/>
+                      </a:endParaRPr>
+                    </a:p>
+                  </a:txBody>
+                  <a:tcPr marL="9525" marR="9525" marT="9525" marB="0" anchor="b"/>
+                </a:tc>
+                <a:tc>
+                  <a:txBody>
+                    <a:bodyPr/>
+                    <a:lstStyle/>
+                    <a:p>
+                      <a:pPr algn="ctr" fontAlgn="b"/>
+                      <a:r>
+                        <a:rPr lang="en-CA" sz="1600" u="none" strike="noStrike">
+                          <a:effectLst/>
+                          <a:latin typeface="Calibri" panose="020F0502020204030204" pitchFamily="34" charset="0"/>
+                        </a:rPr>
+                        <a:t>54</a:t>
+                      </a:r>
+                      <a:endParaRPr lang="en-CA" sz="1600" b="0" i="0" u="none" strike="noStrike">
+                        <a:solidFill>
+                          <a:srgbClr val="000000"/>
+                        </a:solidFill>
+                        <a:effectLst/>
+                        <a:latin typeface="Calibri" panose="020F0502020204030204" pitchFamily="34" charset="0"/>
+                      </a:endParaRPr>
+                    </a:p>
+                  </a:txBody>
+                  <a:tcPr marL="9525" marR="9525" marT="9525" marB="0" anchor="b"/>
+                </a:tc>
                 <a:tc>
                   <a:txBody>
                     <a:bodyPr/>
@@ -6842,7 +6995,7 @@
                           <a:effectLst/>
                           <a:latin typeface="Calibri" panose="020F0502020204030204" pitchFamily="34" charset="0"/>
                         </a:rPr>
-                        <a:t>3</a:t>
+                        <a:t>9</a:t>
                       </a:r>
                       <a:endParaRPr lang="en-CA" sz="1600" b="0" i="0" u="none" strike="noStrike" dirty="0">
                         <a:solidFill>
@@ -6855,263 +7008,45 @@
                   </a:txBody>
                   <a:tcPr marL="9525" marR="9525" marT="9525" marB="0" anchor="b"/>
                 </a:tc>
-                <a:tc>
-                  <a:txBody>
-                    <a:bodyPr/>
-                    <a:lstStyle/>
-                    <a:p>
-                      <a:pPr algn="ctr" fontAlgn="b"/>
-                      <a:r>
-                        <a:rPr lang="en-CA" sz="1600" u="none" strike="noStrike" dirty="0">
+              </a:tr>
+              <a:tr h="396044">
+                <a:tc>
+                  <a:txBody>
+                    <a:bodyPr/>
+                    <a:lstStyle/>
+                    <a:p>
+                      <a:pPr algn="ctr" fontAlgn="b"/>
+                      <a:r>
+                        <a:rPr lang="en-CA" sz="1600" u="none" strike="noStrike">
+                          <a:effectLst/>
+                          <a:latin typeface="Calibri" panose="020F0502020204030204" pitchFamily="34" charset="0"/>
+                        </a:rPr>
+                        <a:t>2</a:t>
+                      </a:r>
+                      <a:endParaRPr lang="en-CA" sz="1600" b="0" i="0" u="none" strike="noStrike">
+                        <a:solidFill>
+                          <a:srgbClr val="000000"/>
+                        </a:solidFill>
+                        <a:effectLst/>
+                        <a:latin typeface="Calibri" panose="020F0502020204030204" pitchFamily="34" charset="0"/>
+                      </a:endParaRPr>
+                    </a:p>
+                  </a:txBody>
+                  <a:tcPr marL="9525" marR="9525" marT="9525" marB="0" anchor="b"/>
+                </a:tc>
+                <a:tc>
+                  <a:txBody>
+                    <a:bodyPr/>
+                    <a:lstStyle/>
+                    <a:p>
+                      <a:pPr algn="ctr" fontAlgn="b"/>
+                      <a:r>
+                        <a:rPr lang="en-CA" sz="1600" u="none" strike="noStrike">
                           <a:effectLst/>
                           <a:latin typeface="Calibri" panose="020F0502020204030204" pitchFamily="34" charset="0"/>
                         </a:rPr>
                         <a:t>9</a:t>
                       </a:r>
-                      <a:endParaRPr lang="en-CA" sz="1600" b="0" i="0" u="none" strike="noStrike" dirty="0">
-                        <a:solidFill>
-                          <a:srgbClr val="000000"/>
-                        </a:solidFill>
-                        <a:effectLst/>
-                        <a:latin typeface="Calibri" panose="020F0502020204030204" pitchFamily="34" charset="0"/>
-                      </a:endParaRPr>
-                    </a:p>
-                  </a:txBody>
-                  <a:tcPr marL="9525" marR="9525" marT="9525" marB="0" anchor="b"/>
-                </a:tc>
-                <a:tc>
-                  <a:txBody>
-                    <a:bodyPr/>
-                    <a:lstStyle/>
-                    <a:p>
-                      <a:pPr algn="ctr" fontAlgn="b"/>
-                      <a:r>
-                        <a:rPr lang="en-CA" sz="1600" u="none" strike="noStrike" dirty="0">
-                          <a:effectLst/>
-                          <a:latin typeface="Calibri" panose="020F0502020204030204" pitchFamily="34" charset="0"/>
-                        </a:rPr>
-                        <a:t>84</a:t>
-                      </a:r>
-                      <a:endParaRPr lang="en-CA" sz="1600" b="0" i="0" u="none" strike="noStrike" dirty="0">
-                        <a:solidFill>
-                          <a:srgbClr val="000000"/>
-                        </a:solidFill>
-                        <a:effectLst/>
-                        <a:latin typeface="Calibri" panose="020F0502020204030204" pitchFamily="34" charset="0"/>
-                      </a:endParaRPr>
-                    </a:p>
-                  </a:txBody>
-                  <a:tcPr marL="9525" marR="9525" marT="9525" marB="0" anchor="b"/>
-                </a:tc>
-                <a:tc>
-                  <a:txBody>
-                    <a:bodyPr/>
-                    <a:lstStyle/>
-                    <a:p>
-                      <a:pPr algn="ctr" fontAlgn="b"/>
-                      <a:r>
-                        <a:rPr lang="en-CA" sz="1600" u="none" strike="noStrike" dirty="0">
-                          <a:effectLst/>
-                          <a:latin typeface="Calibri" panose="020F0502020204030204" pitchFamily="34" charset="0"/>
-                        </a:rPr>
-                        <a:t>3</a:t>
-                      </a:r>
-                      <a:endParaRPr lang="en-CA" sz="1600" b="0" i="0" u="none" strike="noStrike" dirty="0">
-                        <a:solidFill>
-                          <a:srgbClr val="000000"/>
-                        </a:solidFill>
-                        <a:effectLst/>
-                        <a:latin typeface="Calibri" panose="020F0502020204030204" pitchFamily="34" charset="0"/>
-                      </a:endParaRPr>
-                    </a:p>
-                  </a:txBody>
-                  <a:tcPr marL="9525" marR="9525" marT="9525" marB="0" anchor="b"/>
-                </a:tc>
-                <a:tc>
-                  <a:txBody>
-                    <a:bodyPr/>
-                    <a:lstStyle/>
-                    <a:p>
-                      <a:pPr algn="ctr" fontAlgn="b"/>
-                      <a:r>
-                        <a:rPr lang="en-CA" sz="1600" u="none" strike="noStrike" dirty="0">
-                          <a:effectLst/>
-                          <a:latin typeface="Calibri" panose="020F0502020204030204" pitchFamily="34" charset="0"/>
-                        </a:rPr>
-                        <a:t>9</a:t>
-                      </a:r>
-                      <a:endParaRPr lang="en-CA" sz="1600" b="0" i="0" u="none" strike="noStrike" dirty="0">
-                        <a:solidFill>
-                          <a:srgbClr val="000000"/>
-                        </a:solidFill>
-                        <a:effectLst/>
-                        <a:latin typeface="Calibri" panose="020F0502020204030204" pitchFamily="34" charset="0"/>
-                      </a:endParaRPr>
-                    </a:p>
-                  </a:txBody>
-                  <a:tcPr marL="9525" marR="9525" marT="9525" marB="0" anchor="b"/>
-                </a:tc>
-              </a:tr>
-              <a:tr h="384043">
-                <a:tc>
-                  <a:txBody>
-                    <a:bodyPr/>
-                    <a:lstStyle/>
-                    <a:p>
-                      <a:pPr algn="ctr" fontAlgn="b"/>
-                      <a:r>
-                        <a:rPr lang="en-CA" sz="1600" u="none" strike="noStrike">
-                          <a:effectLst/>
-                          <a:latin typeface="Calibri" panose="020F0502020204030204" pitchFamily="34" charset="0"/>
-                        </a:rPr>
-                        <a:t>2</a:t>
-                      </a:r>
-                      <a:endParaRPr lang="en-CA" sz="1600" b="0" i="0" u="none" strike="noStrike">
-                        <a:solidFill>
-                          <a:srgbClr val="000000"/>
-                        </a:solidFill>
-                        <a:effectLst/>
-                        <a:latin typeface="Calibri" panose="020F0502020204030204" pitchFamily="34" charset="0"/>
-                      </a:endParaRPr>
-                    </a:p>
-                  </a:txBody>
-                  <a:tcPr marL="9525" marR="9525" marT="9525" marB="0" anchor="b"/>
-                </a:tc>
-                <a:tc>
-                  <a:txBody>
-                    <a:bodyPr/>
-                    <a:lstStyle/>
-                    <a:p>
-                      <a:pPr algn="ctr" fontAlgn="b"/>
-                      <a:r>
-                        <a:rPr lang="en-CA" sz="1600" u="none" strike="noStrike">
-                          <a:effectLst/>
-                          <a:latin typeface="Calibri" panose="020F0502020204030204" pitchFamily="34" charset="0"/>
-                        </a:rPr>
-                        <a:t>6</a:t>
-                      </a:r>
-                      <a:endParaRPr lang="en-CA" sz="1600" b="0" i="0" u="none" strike="noStrike">
-                        <a:solidFill>
-                          <a:srgbClr val="000000"/>
-                        </a:solidFill>
-                        <a:effectLst/>
-                        <a:latin typeface="Calibri" panose="020F0502020204030204" pitchFamily="34" charset="0"/>
-                      </a:endParaRPr>
-                    </a:p>
-                  </a:txBody>
-                  <a:tcPr marL="9525" marR="9525" marT="9525" marB="0" anchor="b"/>
-                </a:tc>
-                <a:tc>
-                  <a:txBody>
-                    <a:bodyPr/>
-                    <a:lstStyle/>
-                    <a:p>
-                      <a:pPr algn="ctr" fontAlgn="b"/>
-                      <a:r>
-                        <a:rPr lang="en-CA" sz="1600" u="none" strike="noStrike">
-                          <a:effectLst/>
-                          <a:latin typeface="Calibri" panose="020F0502020204030204" pitchFamily="34" charset="0"/>
-                        </a:rPr>
-                        <a:t>54</a:t>
-                      </a:r>
-                      <a:endParaRPr lang="en-CA" sz="1600" b="0" i="0" u="none" strike="noStrike">
-                        <a:solidFill>
-                          <a:srgbClr val="000000"/>
-                        </a:solidFill>
-                        <a:effectLst/>
-                        <a:latin typeface="Calibri" panose="020F0502020204030204" pitchFamily="34" charset="0"/>
-                      </a:endParaRPr>
-                    </a:p>
-                  </a:txBody>
-                  <a:tcPr marL="9525" marR="9525" marT="9525" marB="0" anchor="b"/>
-                </a:tc>
-                <a:tc>
-                  <a:txBody>
-                    <a:bodyPr/>
-                    <a:lstStyle/>
-                    <a:p>
-                      <a:pPr algn="ctr" fontAlgn="b"/>
-                      <a:r>
-                        <a:rPr lang="en-CA" sz="1600" u="none" strike="noStrike">
-                          <a:effectLst/>
-                          <a:latin typeface="Calibri" panose="020F0502020204030204" pitchFamily="34" charset="0"/>
-                        </a:rPr>
-                        <a:t>2</a:t>
-                      </a:r>
-                      <a:endParaRPr lang="en-CA" sz="1600" b="0" i="0" u="none" strike="noStrike">
-                        <a:solidFill>
-                          <a:srgbClr val="000000"/>
-                        </a:solidFill>
-                        <a:effectLst/>
-                        <a:latin typeface="Calibri" panose="020F0502020204030204" pitchFamily="34" charset="0"/>
-                      </a:endParaRPr>
-                    </a:p>
-                  </a:txBody>
-                  <a:tcPr marL="9525" marR="9525" marT="9525" marB="0" anchor="b"/>
-                </a:tc>
-                <a:tc>
-                  <a:txBody>
-                    <a:bodyPr/>
-                    <a:lstStyle/>
-                    <a:p>
-                      <a:pPr algn="ctr" fontAlgn="b"/>
-                      <a:r>
-                        <a:rPr lang="en-CA" sz="1600" u="none" strike="noStrike" dirty="0">
-                          <a:effectLst/>
-                          <a:latin typeface="Calibri" panose="020F0502020204030204" pitchFamily="34" charset="0"/>
-                        </a:rPr>
-                        <a:t>9</a:t>
-                      </a:r>
-                      <a:endParaRPr lang="en-CA" sz="1600" b="0" i="0" u="none" strike="noStrike" dirty="0">
-                        <a:solidFill>
-                          <a:srgbClr val="000000"/>
-                        </a:solidFill>
-                        <a:effectLst/>
-                        <a:latin typeface="Calibri" panose="020F0502020204030204" pitchFamily="34" charset="0"/>
-                      </a:endParaRPr>
-                    </a:p>
-                  </a:txBody>
-                  <a:tcPr marL="9525" marR="9525" marT="9525" marB="0" anchor="b"/>
-                </a:tc>
-              </a:tr>
-              <a:tr h="384043">
-                <a:tc>
-                  <a:txBody>
-                    <a:bodyPr/>
-                    <a:lstStyle/>
-                    <a:p>
-                      <a:pPr algn="ctr" fontAlgn="b"/>
-                      <a:r>
-                        <a:rPr lang="en-CA" sz="1600" u="none" strike="noStrike">
-                          <a:effectLst/>
-                          <a:latin typeface="Calibri" panose="020F0502020204030204" pitchFamily="34" charset="0"/>
-                        </a:rPr>
-                        <a:t>2</a:t>
-                      </a:r>
-                      <a:endParaRPr lang="en-CA" sz="1600" b="0" i="0" u="none" strike="noStrike">
-                        <a:solidFill>
-                          <a:srgbClr val="000000"/>
-                        </a:solidFill>
-                        <a:effectLst/>
-                        <a:latin typeface="Calibri" panose="020F0502020204030204" pitchFamily="34" charset="0"/>
-                      </a:endParaRPr>
-                    </a:p>
-                  </a:txBody>
-                  <a:tcPr marL="9525" marR="9525" marT="9525" marB="0" anchor="b"/>
-                </a:tc>
-                <a:tc>
-                  <a:txBody>
-                    <a:bodyPr/>
-                    <a:lstStyle/>
-                    <a:p>
-                      <a:pPr algn="ctr" fontAlgn="b"/>
-                      <a:r>
-                        <a:rPr lang="en-CA" sz="1600" u="none" strike="noStrike">
-                          <a:effectLst/>
-                          <a:latin typeface="Calibri" panose="020F0502020204030204" pitchFamily="34" charset="0"/>
-                        </a:rPr>
-                        <a:t>9</a:t>
-                      </a:r>
                       <a:endParaRPr lang="en-CA" sz="1600" b="0" i="0" u="none" strike="noStrike">
                         <a:solidFill>
                           <a:srgbClr val="000000"/>
@@ -7135,30 +7070,6 @@
                           <a:latin typeface="Calibri" panose="020F0502020204030204" pitchFamily="34" charset="0"/>
                         </a:rPr>
                         <a:t>90</a:t>
-                      </a:r>
-                      <a:endParaRPr lang="en-CA" sz="1600" b="0" i="0" u="none" strike="noStrike">
-                        <a:solidFill>
-                          <a:srgbClr val="000000"/>
-                        </a:solidFill>
-                        <a:effectLst/>
-                        <a:latin typeface="Calibri" panose="020F0502020204030204" pitchFamily="34" charset="0"/>
-                      </a:endParaRPr>
-                    </a:p>
-                  </a:txBody>
-                  <a:tcPr marL="9525" marR="9525" marT="9525" marB="0" anchor="b"/>
-                </a:tc>
-                <a:tc>
-                  <a:txBody>
-                    <a:bodyPr/>
-                    <a:lstStyle/>
-                    <a:p>
-                      <a:pPr algn="ctr" fontAlgn="b"/>
-                      <a:r>
-                        <a:rPr lang="en-CA" sz="1600" u="none" strike="noStrike">
-                          <a:effectLst/>
-                          <a:latin typeface="Calibri" panose="020F0502020204030204" pitchFamily="34" charset="0"/>
-                        </a:rPr>
-                        <a:t>2</a:t>
                       </a:r>
                       <a:endParaRPr lang="en-CA" sz="1600" b="0" i="0" u="none" strike="noStrike">
                         <a:solidFill>
@@ -7335,13 +7246,13 @@
                     <a:p>
                       <a:pPr algn="ctr" fontAlgn="b"/>
                       <a:r>
-                        <a:rPr lang="en-CA" sz="1600" u="none" strike="noStrike">
+                        <a:rPr lang="en-CA" sz="1600" u="none" strike="noStrike" dirty="0">
                           <a:effectLst/>
                           <a:latin typeface="Calibri" panose="020F0502020204030204" pitchFamily="34" charset="0"/>
                         </a:rPr>
                         <a:t>7</a:t>
                       </a:r>
-                      <a:endParaRPr lang="en-CA" sz="1600" b="0" i="0" u="none" strike="noStrike">
+                      <a:endParaRPr lang="en-CA" sz="1600" b="0" i="0" u="none" strike="noStrike" dirty="0">
                         <a:solidFill>
                           <a:srgbClr val="000000"/>
                         </a:solidFill>
@@ -7507,13 +7418,13 @@
                     <a:p>
                       <a:pPr algn="ctr" fontAlgn="b"/>
                       <a:r>
-                        <a:rPr lang="en-CA" sz="1600" u="none" strike="noStrike">
+                        <a:rPr lang="en-CA" sz="1600" u="none" strike="noStrike" dirty="0">
                           <a:effectLst/>
                           <a:latin typeface="Calibri" panose="020F0502020204030204" pitchFamily="34" charset="0"/>
                         </a:rPr>
                         <a:t>19</a:t>
                       </a:r>
-                      <a:endParaRPr lang="en-CA" sz="1600" b="0" i="0" u="none" strike="noStrike">
+                      <a:endParaRPr lang="en-CA" sz="1600" b="0" i="0" u="none" strike="noStrike" dirty="0">
                         <a:solidFill>
                           <a:srgbClr val="000000"/>
                         </a:solidFill>
@@ -7685,7 +7596,7 @@
         </p:nvSpPr>
         <p:spPr>
           <a:xfrm>
-            <a:off x="6153463" y="3455765"/>
+            <a:off x="5952172" y="3825097"/>
             <a:ext cx="1339656" cy="369332"/>
           </a:xfrm>
           <a:prstGeom prst="rect">
@@ -7723,6 +7634,190 @@
           </a:p>
         </p:txBody>
       </p:sp>
+      <p:sp>
+        <p:nvSpPr>
+          <p:cNvPr id="4" name="Curved Left Arrow 3"/>
+          <p:cNvSpPr/>
+          <p:nvPr/>
+        </p:nvSpPr>
+        <p:spPr>
+          <a:xfrm>
+            <a:off x="3131840" y="3028341"/>
+            <a:ext cx="1055574" cy="1216152"/>
+          </a:xfrm>
+          <a:prstGeom prst="curvedLeftArrow">
+            <a:avLst>
+              <a:gd name="adj1" fmla="val 8996"/>
+              <a:gd name="adj2" fmla="val 50000"/>
+              <a:gd name="adj3" fmla="val 18437"/>
+            </a:avLst>
+          </a:prstGeom>
+        </p:spPr>
+        <p:style>
+          <a:lnRef idx="2">
+            <a:schemeClr val="accent1">
+              <a:shade val="50000"/>
+            </a:schemeClr>
+          </a:lnRef>
+          <a:fillRef idx="1">
+            <a:schemeClr val="accent1"/>
+          </a:fillRef>
+          <a:effectRef idx="0">
+            <a:schemeClr val="accent1"/>
+          </a:effectRef>
+          <a:fontRef idx="minor">
+            <a:schemeClr val="lt1"/>
+          </a:fontRef>
+        </p:style>
+        <p:txBody>
+          <a:bodyPr rtlCol="0" anchor="ctr"/>
+          <a:lstStyle/>
+          <a:p>
+            <a:pPr algn="ctr"/>
+            <a:r>
+              <a:rPr lang="en-US" b="1" dirty="0" smtClean="0">
+                <a:ln w="12700">
+                  <a:solidFill>
+                    <a:schemeClr val="tx2">
+                      <a:satMod val="155000"/>
+                    </a:schemeClr>
+                  </a:solidFill>
+                  <a:prstDash val="solid"/>
+                </a:ln>
+                <a:solidFill>
+                  <a:schemeClr val="bg2">
+                    <a:tint val="85000"/>
+                    <a:satMod val="155000"/>
+                  </a:schemeClr>
+                </a:solidFill>
+                <a:effectLst>
+                  <a:outerShdw blurRad="41275" dist="20320" dir="1800000" algn="tl" rotWithShape="0">
+                    <a:srgbClr val="000000">
+                      <a:alpha val="40000"/>
+                    </a:srgbClr>
+                  </a:outerShdw>
+                </a:effectLst>
+              </a:rPr>
+              <a:t>Join</a:t>
+            </a:r>
+            <a:endParaRPr lang="en-CA" b="1" dirty="0">
+              <a:ln w="12700">
+                <a:solidFill>
+                  <a:schemeClr val="tx2">
+                    <a:satMod val="155000"/>
+                  </a:schemeClr>
+                </a:solidFill>
+                <a:prstDash val="solid"/>
+              </a:ln>
+              <a:solidFill>
+                <a:schemeClr val="bg2">
+                  <a:tint val="85000"/>
+                  <a:satMod val="155000"/>
+                </a:schemeClr>
+              </a:solidFill>
+              <a:effectLst>
+                <a:outerShdw blurRad="41275" dist="20320" dir="1800000" algn="tl" rotWithShape="0">
+                  <a:srgbClr val="000000">
+                    <a:alpha val="40000"/>
+                  </a:srgbClr>
+                </a:outerShdw>
+              </a:effectLst>
+            </a:endParaRPr>
+          </a:p>
+        </p:txBody>
+      </p:sp>
+      <p:sp>
+        <p:nvSpPr>
+          <p:cNvPr id="8" name="Curved Right Arrow 7"/>
+          <p:cNvSpPr/>
+          <p:nvPr/>
+        </p:nvSpPr>
+        <p:spPr>
+          <a:xfrm>
+            <a:off x="4593971" y="3028341"/>
+            <a:ext cx="1163568" cy="1216152"/>
+          </a:xfrm>
+          <a:prstGeom prst="curvedRightArrow">
+            <a:avLst>
+              <a:gd name="adj1" fmla="val 8005"/>
+              <a:gd name="adj2" fmla="val 37996"/>
+              <a:gd name="adj3" fmla="val 21428"/>
+            </a:avLst>
+          </a:prstGeom>
+        </p:spPr>
+        <p:style>
+          <a:lnRef idx="2">
+            <a:schemeClr val="accent1">
+              <a:shade val="50000"/>
+            </a:schemeClr>
+          </a:lnRef>
+          <a:fillRef idx="1">
+            <a:schemeClr val="accent1"/>
+          </a:fillRef>
+          <a:effectRef idx="0">
+            <a:schemeClr val="accent1"/>
+          </a:effectRef>
+          <a:fontRef idx="minor">
+            <a:schemeClr val="lt1"/>
+          </a:fontRef>
+        </p:style>
+        <p:txBody>
+          <a:bodyPr rtlCol="0" anchor="ctr"/>
+          <a:lstStyle/>
+          <a:p>
+            <a:pPr algn="ctr"/>
+            <a:r>
+              <a:rPr lang="en-US" b="1" dirty="0" smtClean="0">
+                <a:ln w="12700">
+                  <a:solidFill>
+                    <a:schemeClr val="tx2">
+                      <a:satMod val="155000"/>
+                    </a:schemeClr>
+                  </a:solidFill>
+                  <a:prstDash val="solid"/>
+                </a:ln>
+                <a:solidFill>
+                  <a:schemeClr val="bg2">
+                    <a:tint val="85000"/>
+                    <a:satMod val="155000"/>
+                  </a:schemeClr>
+                </a:solidFill>
+                <a:effectLst>
+                  <a:outerShdw blurRad="41275" dist="20320" dir="1800000" algn="tl" rotWithShape="0">
+                    <a:srgbClr val="000000">
+                      <a:alpha val="40000"/>
+                    </a:srgbClr>
+                  </a:outerShdw>
+                </a:effectLst>
+              </a:rPr>
+              <a:t>Union</a:t>
+            </a:r>
+            <a:endParaRPr lang="en-CA" b="1" dirty="0">
+              <a:ln w="12700">
+                <a:solidFill>
+                  <a:schemeClr val="tx2">
+                    <a:satMod val="155000"/>
+                  </a:schemeClr>
+                </a:solidFill>
+                <a:prstDash val="solid"/>
+              </a:ln>
+              <a:solidFill>
+                <a:schemeClr val="bg2">
+                  <a:tint val="85000"/>
+                  <a:satMod val="155000"/>
+                </a:schemeClr>
+              </a:solidFill>
+              <a:effectLst>
+                <a:outerShdw blurRad="41275" dist="20320" dir="1800000" algn="tl" rotWithShape="0">
+                  <a:srgbClr val="000000">
+                    <a:alpha val="40000"/>
+                  </a:srgbClr>
+                </a:outerShdw>
+              </a:effectLst>
+            </a:endParaRPr>
+          </a:p>
+        </p:txBody>
+      </p:sp>
     </p:spTree>
     <p:extLst>
       <p:ext uri="{BB962C8B-B14F-4D97-AF65-F5344CB8AC3E}">
@@ -7736,9 +7831,540 @@
   <p:timing>
     <p:tnLst>
       <p:par>
-        <p:cTn id="1" dur="indefinite" restart="never" nodeType="tmRoot"/>
+        <p:cTn id="1" dur="indefinite" restart="never" nodeType="tmRoot">
+          <p:childTnLst>
+            <p:seq concurrent="1" nextAc="seek">
+              <p:cTn id="2" dur="indefinite" nodeType="mainSeq">
+                <p:childTnLst>
+                  <p:par>
+                    <p:cTn id="3" fill="hold">
+                      <p:stCondLst>
+                        <p:cond delay="indefinite"/>
+                      </p:stCondLst>
+                      <p:childTnLst>
+                        <p:par>
+                          <p:cTn id="4" fill="hold">
+                            <p:stCondLst>
+                              <p:cond delay="0"/>
+                            </p:stCondLst>
+                            <p:childTnLst>
+                              <p:par>
+                                <p:cTn id="5" presetID="6" presetClass="entr" presetSubtype="16" fill="hold" grpId="0" nodeType="clickEffect">
+                                  <p:stCondLst>
+                                    <p:cond delay="0"/>
+                                  </p:stCondLst>
+                                  <p:childTnLst>
+                                    <p:set>
+                                      <p:cBhvr>
+                                        <p:cTn id="6" dur="1" fill="hold">
+                                          <p:stCondLst>
+                                            <p:cond delay="0"/>
+                                          </p:stCondLst>
+                                        </p:cTn>
+                                        <p:tgtEl>
+                                          <p:spTgt spid="4"/>
+                                        </p:tgtEl>
+                                        <p:attrNameLst>
+                                          <p:attrName>style.visibility</p:attrName>
+                                        </p:attrNameLst>
+                                      </p:cBhvr>
+                                      <p:to>
+                                        <p:strVal val="visible"/>
+                                      </p:to>
+                                    </p:set>
+                                    <p:animEffect transition="in" filter="circle(in)">
+                                      <p:cBhvr>
+                                        <p:cTn id="7" dur="2000"/>
+                                        <p:tgtEl>
+                                          <p:spTgt spid="4"/>
+                                        </p:tgtEl>
+                                      </p:cBhvr>
+                                    </p:animEffect>
+                                  </p:childTnLst>
+                                </p:cTn>
+                              </p:par>
+                            </p:childTnLst>
+                          </p:cTn>
+                        </p:par>
+                      </p:childTnLst>
+                    </p:cTn>
+                  </p:par>
+                  <p:par>
+                    <p:cTn id="8" fill="hold">
+                      <p:stCondLst>
+                        <p:cond delay="indefinite"/>
+                      </p:stCondLst>
+                      <p:childTnLst>
+                        <p:par>
+                          <p:cTn id="9" fill="hold">
+                            <p:stCondLst>
+                              <p:cond delay="0"/>
+                            </p:stCondLst>
+                            <p:childTnLst>
+                              <p:par>
+                                <p:cTn id="10" presetID="42" presetClass="entr" presetSubtype="0" fill="hold" grpId="0" nodeType="clickEffect">
+                                  <p:stCondLst>
+                                    <p:cond delay="0"/>
+                                  </p:stCondLst>
+                                  <p:childTnLst>
+                                    <p:set>
+                                      <p:cBhvr>
+                                        <p:cTn id="11" dur="1" fill="hold">
+                                          <p:stCondLst>
+                                            <p:cond delay="0"/>
+                                          </p:stCondLst>
+                                        </p:cTn>
+                                        <p:tgtEl>
+                                          <p:spTgt spid="12"/>
+                                        </p:tgtEl>
+                                        <p:attrNameLst>
+                                          <p:attrName>style.visibility</p:attrName>
+                                        </p:attrNameLst>
+                                      </p:cBhvr>
+                                      <p:to>
+                                        <p:strVal val="visible"/>
+                                      </p:to>
+                                    </p:set>
+                                    <p:animEffect transition="in" filter="fade">
+                                      <p:cBhvr>
+                                        <p:cTn id="12" dur="1000"/>
+                                        <p:tgtEl>
+                                          <p:spTgt spid="12"/>
+                                        </p:tgtEl>
+                                      </p:cBhvr>
+                                    </p:animEffect>
+                                    <p:anim calcmode="lin" valueType="num">
+                                      <p:cBhvr>
+                                        <p:cTn id="13" dur="1000" fill="hold"/>
+                                        <p:tgtEl>
+                                          <p:spTgt spid="12"/>
+                                        </p:tgtEl>
+                                        <p:attrNameLst>
+                                          <p:attrName>ppt_x</p:attrName>
+                                        </p:attrNameLst>
+                                      </p:cBhvr>
+                                      <p:tavLst>
+                                        <p:tav tm="0">
+                                          <p:val>
+                                            <p:strVal val="#ppt_x"/>
+                                          </p:val>
+                                        </p:tav>
+                                        <p:tav tm="100000">
+                                          <p:val>
+                                            <p:strVal val="#ppt_x"/>
+                                          </p:val>
+                                        </p:tav>
+                                      </p:tavLst>
+                                    </p:anim>
+                                    <p:anim calcmode="lin" valueType="num">
+                                      <p:cBhvr>
+                                        <p:cTn id="14" dur="1000" fill="hold"/>
+                                        <p:tgtEl>
+                                          <p:spTgt spid="12"/>
+                                        </p:tgtEl>
+                                        <p:attrNameLst>
+                                          <p:attrName>ppt_y</p:attrName>
+                                        </p:attrNameLst>
+                                      </p:cBhvr>
+                                      <p:tavLst>
+                                        <p:tav tm="0">
+                                          <p:val>
+                                            <p:strVal val="#ppt_y+.1"/>
+                                          </p:val>
+                                        </p:tav>
+                                        <p:tav tm="100000">
+                                          <p:val>
+                                            <p:strVal val="#ppt_y"/>
+                                          </p:val>
+                                        </p:tav>
+                                      </p:tavLst>
+                                    </p:anim>
+                                  </p:childTnLst>
+                                </p:cTn>
+                              </p:par>
+                            </p:childTnLst>
+                          </p:cTn>
+                        </p:par>
+                      </p:childTnLst>
+                    </p:cTn>
+                  </p:par>
+                  <p:par>
+                    <p:cTn id="15" fill="hold">
+                      <p:stCondLst>
+                        <p:cond delay="indefinite"/>
+                      </p:stCondLst>
+                      <p:childTnLst>
+                        <p:par>
+                          <p:cTn id="16" fill="hold">
+                            <p:stCondLst>
+                              <p:cond delay="0"/>
+                            </p:stCondLst>
+                            <p:childTnLst>
+                              <p:par>
+                                <p:cTn id="17" presetID="42" presetClass="entr" presetSubtype="0" fill="hold" nodeType="clickEffect">
+                                  <p:stCondLst>
+                                    <p:cond delay="0"/>
+                                  </p:stCondLst>
+                                  <p:childTnLst>
+                                    <p:set>
+                                      <p:cBhvr>
+                                        <p:cTn id="18" dur="1" fill="hold">
+                                          <p:stCondLst>
+                                            <p:cond delay="0"/>
+                                          </p:stCondLst>
+                                        </p:cTn>
+                                        <p:tgtEl>
+                                          <p:spTgt spid="13"/>
+                                        </p:tgtEl>
+                                        <p:attrNameLst>
+                                          <p:attrName>style.visibility</p:attrName>
+                                        </p:attrNameLst>
+                                      </p:cBhvr>
+                                      <p:to>
+                                        <p:strVal val="visible"/>
+                                      </p:to>
+                                    </p:set>
+                                    <p:animEffect transition="in" filter="fade">
+                                      <p:cBhvr>
+                                        <p:cTn id="19" dur="1000"/>
+                                        <p:tgtEl>
+                                          <p:spTgt spid="13"/>
+                                        </p:tgtEl>
+                                      </p:cBhvr>
+                                    </p:animEffect>
+                                    <p:anim calcmode="lin" valueType="num">
+                                      <p:cBhvr>
+                                        <p:cTn id="20" dur="1000" fill="hold"/>
+                                        <p:tgtEl>
+                                          <p:spTgt spid="13"/>
+                                        </p:tgtEl>
+                                        <p:attrNameLst>
+                                          <p:attrName>ppt_x</p:attrName>
+                                        </p:attrNameLst>
+                                      </p:cBhvr>
+                                      <p:tavLst>
+                                        <p:tav tm="0">
+                                          <p:val>
+                                            <p:strVal val="#ppt_x"/>
+                                          </p:val>
+                                        </p:tav>
+                                        <p:tav tm="100000">
+                                          <p:val>
+                                            <p:strVal val="#ppt_x"/>
+                                          </p:val>
+                                        </p:tav>
+                                      </p:tavLst>
+                                    </p:anim>
+                                    <p:anim calcmode="lin" valueType="num">
+                                      <p:cBhvr>
+                                        <p:cTn id="21" dur="1000" fill="hold"/>
+                                        <p:tgtEl>
+                                          <p:spTgt spid="13"/>
+                                        </p:tgtEl>
+                                        <p:attrNameLst>
+                                          <p:attrName>ppt_y</p:attrName>
+                                        </p:attrNameLst>
+                                      </p:cBhvr>
+                                      <p:tavLst>
+                                        <p:tav tm="0">
+                                          <p:val>
+                                            <p:strVal val="#ppt_y+.1"/>
+                                          </p:val>
+                                        </p:tav>
+                                        <p:tav tm="100000">
+                                          <p:val>
+                                            <p:strVal val="#ppt_y"/>
+                                          </p:val>
+                                        </p:tav>
+                                      </p:tavLst>
+                                    </p:anim>
+                                  </p:childTnLst>
+                                </p:cTn>
+                              </p:par>
+                            </p:childTnLst>
+                          </p:cTn>
+                        </p:par>
+                      </p:childTnLst>
+                    </p:cTn>
+                  </p:par>
+                  <p:par>
+                    <p:cTn id="22" fill="hold">
+                      <p:stCondLst>
+                        <p:cond delay="indefinite"/>
+                      </p:stCondLst>
+                      <p:childTnLst>
+                        <p:par>
+                          <p:cTn id="23" fill="hold">
+                            <p:stCondLst>
+                              <p:cond delay="0"/>
+                            </p:stCondLst>
+                            <p:childTnLst>
+                              <p:par>
+                                <p:cTn id="24" presetID="6" presetClass="entr" presetSubtype="16" fill="hold" grpId="0" nodeType="clickEffect">
+                                  <p:stCondLst>
+                                    <p:cond delay="0"/>
+                                  </p:stCondLst>
+                                  <p:childTnLst>
+                                    <p:set>
+                                      <p:cBhvr>
+                                        <p:cTn id="25" dur="1" fill="hold">
+                                          <p:stCondLst>
+                                            <p:cond delay="0"/>
+                                          </p:stCondLst>
+                                        </p:cTn>
+                                        <p:tgtEl>
+                                          <p:spTgt spid="8"/>
+                                        </p:tgtEl>
+                                        <p:attrNameLst>
+                                          <p:attrName>style.visibility</p:attrName>
+                                        </p:attrNameLst>
+                                      </p:cBhvr>
+                                      <p:to>
+                                        <p:strVal val="visible"/>
+                                      </p:to>
+                                    </p:set>
+                                    <p:animEffect transition="in" filter="circle(in)">
+                                      <p:cBhvr>
+                                        <p:cTn id="26" dur="2000"/>
+                                        <p:tgtEl>
+                                          <p:spTgt spid="8"/>
+                                        </p:tgtEl>
+                                      </p:cBhvr>
+                                    </p:animEffect>
+                                  </p:childTnLst>
+                                </p:cTn>
+                              </p:par>
+                            </p:childTnLst>
+                          </p:cTn>
+                        </p:par>
+                      </p:childTnLst>
+                    </p:cTn>
+                  </p:par>
+                  <p:par>
+                    <p:cTn id="27" fill="hold">
+                      <p:stCondLst>
+                        <p:cond delay="indefinite"/>
+                      </p:stCondLst>
+                      <p:childTnLst>
+                        <p:par>
+                          <p:cTn id="28" fill="hold">
+                            <p:stCondLst>
+                              <p:cond delay="0"/>
+                            </p:stCondLst>
+                            <p:childTnLst>
+                              <p:par>
+                                <p:cTn id="29" presetID="42" presetClass="entr" presetSubtype="0" fill="hold" grpId="0" nodeType="clickEffect">
+                                  <p:stCondLst>
+                                    <p:cond delay="0"/>
+                                  </p:stCondLst>
+                                  <p:childTnLst>
+                                    <p:set>
+                                      <p:cBhvr>
+                                        <p:cTn id="30" dur="1" fill="hold">
+                                          <p:stCondLst>
+                                            <p:cond delay="0"/>
+                                          </p:stCondLst>
+                                        </p:cTn>
+                                        <p:tgtEl>
+                                          <p:spTgt spid="19"/>
+                                        </p:tgtEl>
+                                        <p:attrNameLst>
+                                          <p:attrName>style.visibility</p:attrName>
+                                        </p:attrNameLst>
+                                      </p:cBhvr>
+                                      <p:to>
+                                        <p:strVal val="visible"/>
+                                      </p:to>
+                                    </p:set>
+                                    <p:animEffect transition="in" filter="fade">
+                                      <p:cBhvr>
+                                        <p:cTn id="31" dur="1000"/>
+                                        <p:tgtEl>
+                                          <p:spTgt spid="19"/>
+                                        </p:tgtEl>
+                                      </p:cBhvr>
+                                    </p:animEffect>
+                                    <p:anim calcmode="lin" valueType="num">
+                                      <p:cBhvr>
+                                        <p:cTn id="32" dur="1000" fill="hold"/>
+                                        <p:tgtEl>
+                                          <p:spTgt spid="19"/>
+                                        </p:tgtEl>
+                                        <p:attrNameLst>
+                                          <p:attrName>ppt_x</p:attrName>
+                                        </p:attrNameLst>
+                                      </p:cBhvr>
+                                      <p:tavLst>
+                                        <p:tav tm="0">
+                                          <p:val>
+                                            <p:strVal val="#ppt_x"/>
+                                          </p:val>
+                                        </p:tav>
+                                        <p:tav tm="100000">
+                                          <p:val>
+                                            <p:strVal val="#ppt_x"/>
+                                          </p:val>
+                                        </p:tav>
+                                      </p:tavLst>
+                                    </p:anim>
+                                    <p:anim calcmode="lin" valueType="num">
+                                      <p:cBhvr>
+                                        <p:cTn id="33" dur="1000" fill="hold"/>
+                                        <p:tgtEl>
+                                          <p:spTgt spid="19"/>
+                                        </p:tgtEl>
+                                        <p:attrNameLst>
+                                          <p:attrName>ppt_y</p:attrName>
+                                        </p:attrNameLst>
+                                      </p:cBhvr>
+                                      <p:tavLst>
+                                        <p:tav tm="0">
+                                          <p:val>
+                                            <p:strVal val="#ppt_y+.1"/>
+                                          </p:val>
+                                        </p:tav>
+                                        <p:tav tm="100000">
+                                          <p:val>
+                                            <p:strVal val="#ppt_y"/>
+                                          </p:val>
+                                        </p:tav>
+                                      </p:tavLst>
+                                    </p:anim>
+                                  </p:childTnLst>
+                                </p:cTn>
+                              </p:par>
+                            </p:childTnLst>
+                          </p:cTn>
+                        </p:par>
+                      </p:childTnLst>
+                    </p:cTn>
+                  </p:par>
+                  <p:par>
+                    <p:cTn id="34" fill="hold">
+                      <p:stCondLst>
+                        <p:cond delay="indefinite"/>
+                      </p:stCondLst>
+                      <p:childTnLst>
+                        <p:par>
+                          <p:cTn id="35" fill="hold">
+                            <p:stCondLst>
+                              <p:cond delay="0"/>
+                            </p:stCondLst>
+                            <p:childTnLst>
+                              <p:par>
+                                <p:cTn id="36" presetID="42" presetClass="entr" presetSubtype="0" fill="hold" nodeType="clickEffect">
+                                  <p:stCondLst>
+                                    <p:cond delay="0"/>
+                                  </p:stCondLst>
+                                  <p:childTnLst>
+                                    <p:set>
+                                      <p:cBhvr>
+                                        <p:cTn id="37" dur="1" fill="hold">
+                                          <p:stCondLst>
+                                            <p:cond delay="0"/>
+                                          </p:stCondLst>
+                                        </p:cTn>
+                                        <p:tgtEl>
+                                          <p:spTgt spid="18"/>
+                                        </p:tgtEl>
+                                        <p:attrNameLst>
+                                          <p:attrName>style.visibility</p:attrName>
+                                        </p:attrNameLst>
+                                      </p:cBhvr>
+                                      <p:to>
+                                        <p:strVal val="visible"/>
+                                      </p:to>
+                                    </p:set>
+                                    <p:animEffect transition="in" filter="fade">
+                                      <p:cBhvr>
+                                        <p:cTn id="38" dur="1000"/>
+                                        <p:tgtEl>
+                                          <p:spTgt spid="18"/>
+                                        </p:tgtEl>
+                                      </p:cBhvr>
+                                    </p:animEffect>
+                                    <p:anim calcmode="lin" valueType="num">
+                                      <p:cBhvr>
+                                        <p:cTn id="39" dur="1000" fill="hold"/>
+                                        <p:tgtEl>
+                                          <p:spTgt spid="18"/>
+                                        </p:tgtEl>
+                                        <p:attrNameLst>
+                                          <p:attrName>ppt_x</p:attrName>
+                                        </p:attrNameLst>
+                                      </p:cBhvr>
+                                      <p:tavLst>
+                                        <p:tav tm="0">
+                                          <p:val>
+                                            <p:strVal val="#ppt_x"/>
+                                          </p:val>
+                                        </p:tav>
+                                        <p:tav tm="100000">
+                                          <p:val>
+                                            <p:strVal val="#ppt_x"/>
+                                          </p:val>
+                                        </p:tav>
+                                      </p:tavLst>
+                                    </p:anim>
+                                    <p:anim calcmode="lin" valueType="num">
+                                      <p:cBhvr>
+                                        <p:cTn id="40" dur="1000" fill="hold"/>
+                                        <p:tgtEl>
+                                          <p:spTgt spid="18"/>
+                                        </p:tgtEl>
+                                        <p:attrNameLst>
+                                          <p:attrName>ppt_y</p:attrName>
+                                        </p:attrNameLst>
+                                      </p:cBhvr>
+                                      <p:tavLst>
+                                        <p:tav tm="0">
+                                          <p:val>
+                                            <p:strVal val="#ppt_y+.1"/>
+                                          </p:val>
+                                        </p:tav>
+                                        <p:tav tm="100000">
+                                          <p:val>
+                                            <p:strVal val="#ppt_y"/>
+                                          </p:val>
+                                        </p:tav>
+                                      </p:tavLst>
+                                    </p:anim>
+                                  </p:childTnLst>
+                                </p:cTn>
+                              </p:par>
+                            </p:childTnLst>
+                          </p:cTn>
+                        </p:par>
+                      </p:childTnLst>
+                    </p:cTn>
+                  </p:par>
+                </p:childTnLst>
+              </p:cTn>
+              <p:prevCondLst>
+                <p:cond evt="onPrev" delay="0">
+                  <p:tgtEl>
+                    <p:sldTgt/>
+                  </p:tgtEl>
+                </p:cond>
+              </p:prevCondLst>
+              <p:nextCondLst>
+                <p:cond evt="onNext" delay="0">
+                  <p:tgtEl>
+                    <p:sldTgt/>
+                  </p:tgtEl>
+                </p:cond>
+              </p:nextCondLst>
+            </p:seq>
+          </p:childTnLst>
+        </p:cTn>
       </p:par>
     </p:tnLst>
+    <p:bldLst>
+      <p:bldP spid="12" grpId="0"/>
+      <p:bldP spid="19" grpId="0"/>
+      <p:bldP spid="4" grpId="0" animBg="1"/>
+      <p:bldP spid="8" grpId="0" animBg="1"/>
+    </p:bldLst>
   </p:timing>
 </p:sld>
 </file>
@@ -7769,14 +8395,14 @@
           <p:nvPr>
             <p:extLst>
               <p:ext uri="{D42A27DB-BD31-4B8C-83A1-F6EECF244321}">
-                <p14:modId xmlns:p14="http://schemas.microsoft.com/office/powerpoint/2010/main" val="715909492"/>
+                <p14:modId xmlns:p14="http://schemas.microsoft.com/office/powerpoint/2010/main" val="1850719001"/>
               </p:ext>
             </p:extLst>
           </p:nvPr>
         </p:nvGraphicFramePr>
         <p:xfrm>
-          <a:off x="1331640" y="1279981"/>
-          <a:ext cx="2304255" cy="1477145"/>
+          <a:off x="1148199" y="1284227"/>
+          <a:ext cx="2304255" cy="1488366"/>
         </p:xfrm>
         <a:graphic>
           <a:graphicData uri="http://schemas.openxmlformats.org/drawingml/2006/table">
@@ -7789,7 +8415,7 @@
                 <a:gridCol w="549233"/>
                 <a:gridCol w="1274443"/>
               </a:tblGrid>
-              <a:tr h="357194">
+              <a:tr h="368415">
                 <a:tc>
                   <a:txBody>
                     <a:bodyPr/>
@@ -8137,13 +8763,13 @@
           <p:nvPr>
             <p:extLst>
               <p:ext uri="{D42A27DB-BD31-4B8C-83A1-F6EECF244321}">
-                <p14:modId xmlns:p14="http://schemas.microsoft.com/office/powerpoint/2010/main" val="2666299180"/>
+                <p14:modId xmlns:p14="http://schemas.microsoft.com/office/powerpoint/2010/main" val="3710376349"/>
               </p:ext>
             </p:extLst>
           </p:nvPr>
         </p:nvGraphicFramePr>
         <p:xfrm>
-          <a:off x="3779912" y="1284227"/>
+          <a:off x="3635895" y="1284227"/>
           <a:ext cx="2448272" cy="1756790"/>
         </p:xfrm>
         <a:graphic>
@@ -8600,13 +9226,13 @@
           <p:nvPr>
             <p:extLst>
               <p:ext uri="{D42A27DB-BD31-4B8C-83A1-F6EECF244321}">
-                <p14:modId xmlns:p14="http://schemas.microsoft.com/office/powerpoint/2010/main" val="2132829624"/>
+                <p14:modId xmlns:p14="http://schemas.microsoft.com/office/powerpoint/2010/main" val="4235590786"/>
               </p:ext>
             </p:extLst>
           </p:nvPr>
         </p:nvGraphicFramePr>
         <p:xfrm>
-          <a:off x="6372200" y="1284227"/>
+          <a:off x="6228184" y="1284227"/>
           <a:ext cx="2304256" cy="2016224"/>
         </p:xfrm>
         <a:graphic>
@@ -9017,8 +9643,8 @@
           <a:lstStyle/>
           <a:p>
             <a:r>
-              <a:rPr lang="en-US" dirty="0" smtClean="0"/>
-              <a:t>S</a:t>
+              <a:rPr lang="en-US" dirty="0"/>
+              <a:t>M</a:t>
             </a:r>
             <a:endParaRPr lang="en-CA" dirty="0"/>
           </a:p>
@@ -9034,8 +9660,8 @@
             </p:nvSpPr>
             <p:spPr>
               <a:xfrm>
-                <a:off x="1190983" y="3392572"/>
-                <a:ext cx="4536504" cy="369332"/>
+                <a:off x="944148" y="3393995"/>
+                <a:ext cx="5198909" cy="369332"/>
               </a:xfrm>
               <a:prstGeom prst="rect">
                 <a:avLst/>
@@ -9049,34 +9675,58 @@
               <a:lstStyle/>
               <a:p>
                 <a:r>
-                  <a:rPr lang="en-US" dirty="0" smtClean="0"/>
-                  <a:t>q( R, T, S)=</a:t>
+                  <a:rPr lang="en-US" b="1" dirty="0" smtClean="0"/>
+                  <a:t>q( R, T, M)=</a:t>
                 </a:r>
                 <a14:m>
                   <m:oMath xmlns:m="http://schemas.openxmlformats.org/officeDocument/2006/math">
                     <m:r>
-                      <a:rPr lang="el-GR" b="0" i="1" smtClean="0">
+                      <a:rPr lang="el-GR" b="1" i="1" smtClean="0">
                         <a:latin typeface="Cambria Math"/>
                       </a:rPr>
-                      <m:t>𝜋</m:t>
+                      <m:t>𝝅</m:t>
                     </m:r>
                     <m:d>
                       <m:dPr>
                         <m:ctrlPr>
-                          <a:rPr lang="en-US" i="1" baseline="-25000" smtClean="0">
+                          <a:rPr lang="en-US" b="1" i="1" baseline="-25000" smtClean="0">
                             <a:latin typeface="Cambria Math"/>
                           </a:rPr>
                         </m:ctrlPr>
                       </m:dPr>
                       <m:e>
                         <m:r>
-                          <a:rPr lang="en-US" b="0" i="1" baseline="-25000" smtClean="0">
+                          <a:rPr lang="en-US" b="1" i="1" baseline="-25000" smtClean="0">
                             <a:latin typeface="Cambria Math"/>
                           </a:rPr>
-                          <m:t>𝑎</m:t>
+                          <m:t>𝑻</m:t>
                         </m:r>
                         <m:r>
-                          <a:rPr lang="en-US" b="0" i="1" baseline="-25000" smtClean="0">
+                          <a:rPr lang="en-US" b="1" i="1" baseline="-25000" smtClean="0">
+                            <a:latin typeface="Cambria Math"/>
+                          </a:rPr>
+                          <m:t>_</m:t>
+                        </m:r>
+                        <m:r>
+                          <a:rPr lang="en-US" b="1" i="1" baseline="-25000" smtClean="0">
+                            <a:latin typeface="Cambria Math"/>
+                          </a:rPr>
+                          <m:t>𝑹</m:t>
+                        </m:r>
+                        <m:r>
+                          <a:rPr lang="en-US" b="1" i="1" baseline="-25000" smtClean="0">
+                            <a:latin typeface="Cambria Math"/>
+                          </a:rPr>
+                          <m:t>_</m:t>
+                        </m:r>
+                        <m:r>
+                          <a:rPr lang="en-US" b="1" i="1" baseline="-25000" smtClean="0">
+                            <a:latin typeface="Cambria Math"/>
+                          </a:rPr>
+                          <m:t>𝒂</m:t>
+                        </m:r>
+                        <m:r>
+                          <a:rPr lang="en-US" b="1" i="1" baseline="-25000" smtClean="0">
                             <a:latin typeface="Cambria Math"/>
                           </a:rPr>
                           <m:t> </m:t>
@@ -9086,52 +9736,60 @@
                   </m:oMath>
                 </a14:m>
                 <a:r>
-                  <a:rPr lang="en-CA" baseline="-25000" dirty="0" smtClean="0"/>
+                  <a:rPr lang="en-CA" b="1" baseline="-25000" dirty="0" smtClean="0"/>
                   <a:t> </a:t>
                 </a:r>
                 <a:r>
-                  <a:rPr lang="en-CA" dirty="0" smtClean="0"/>
+                  <a:rPr lang="en-CA" b="1" dirty="0" smtClean="0"/>
                   <a:t>(</a:t>
                 </a:r>
                 <a:r>
-                  <a:rPr lang="el-GR" i="1" dirty="0" smtClean="0"/>
+                  <a:rPr lang="el-GR" b="1" i="1" dirty="0" smtClean="0"/>
                   <a:t>σ</a:t>
                 </a:r>
                 <a:r>
-                  <a:rPr lang="en-CA" baseline="-25000" dirty="0" smtClean="0"/>
+                  <a:rPr lang="en-CA" b="1" baseline="-25000" dirty="0" smtClean="0"/>
                   <a:t> </a:t>
                 </a:r>
                 <a:r>
-                  <a:rPr lang="en-CA" dirty="0" smtClean="0"/>
+                  <a:rPr lang="en-CA" b="1" dirty="0" smtClean="0"/>
                   <a:t> </a:t>
                 </a:r>
                 <a:r>
-                  <a:rPr lang="en-CA" baseline="-25000" dirty="0" smtClean="0"/>
+                  <a:rPr lang="en-CA" b="1" baseline="-25000" dirty="0" smtClean="0"/>
                   <a:t>(z=2)</a:t>
                 </a:r>
                 <a:r>
-                  <a:rPr lang="en-CA" dirty="0" smtClean="0"/>
-                  <a:t> S  ⋈ </a:t>
+                  <a:rPr lang="en-CA" b="1" dirty="0" smtClean="0"/>
+                  <a:t> </a:t>
                 </a:r>
                 <a:r>
-                  <a:rPr lang="en-CA" baseline="-25000" dirty="0" smtClean="0"/>
+                  <a:rPr lang="en-CA" b="1" dirty="0" smtClean="0"/>
+                  <a:t>M  </a:t>
+                </a:r>
+                <a:r>
+                  <a:rPr lang="en-CA" b="1" dirty="0" smtClean="0"/>
+                  <a:t>⋈ </a:t>
+                </a:r>
+                <a:r>
+                  <a:rPr lang="en-CA" b="1" baseline="-25000" dirty="0" smtClean="0"/>
                   <a:t>(z=a)</a:t>
                 </a:r>
                 <a:r>
-                  <a:rPr lang="en-US" dirty="0" smtClean="0"/>
+                  <a:rPr lang="en-US" b="1" dirty="0" smtClean="0"/>
                   <a:t>  ( T </a:t>
                 </a:r>
                 <a:r>
-                  <a:rPr lang="en-US" dirty="0" smtClean="0">
+                  <a:rPr lang="en-US" b="1" dirty="0" smtClean="0">
                     <a:sym typeface="Symbol"/>
                   </a:rPr>
                   <a:t>  R</a:t>
                 </a:r>
                 <a:r>
-                  <a:rPr lang="en-US" dirty="0" smtClean="0"/>
+                  <a:rPr lang="en-US" b="1" dirty="0" smtClean="0"/>
                   <a:t> ))</a:t>
                 </a:r>
-                <a:endParaRPr lang="en-CA" dirty="0"/>
+                <a:endParaRPr lang="en-CA" b="1" dirty="0"/>
               </a:p>
             </p:txBody>
           </p:sp>
@@ -9147,8 +9805,8 @@
             </p:nvSpPr>
             <p:spPr>
               <a:xfrm>
-                <a:off x="1190983" y="3392572"/>
-                <a:ext cx="4536504" cy="369332"/>
+                <a:off x="944148" y="3393995"/>
+                <a:ext cx="5198909" cy="369332"/>
               </a:xfrm>
               <a:prstGeom prst="rect">
                 <a:avLst/>
@@ -9156,7 +9814,7 @@
               <a:blipFill rotWithShape="1">
                 <a:blip r:embed="rId2"/>
                 <a:stretch>
-                  <a:fillRect l="-1074" t="-11667" b="-26667"/>
+                  <a:fillRect l="-1055" t="-11667" b="-26667"/>
                 </a:stretch>
               </a:blipFill>
             </p:spPr>
@@ -9184,14 +9842,14 @@
           <p:nvPr>
             <p:extLst>
               <p:ext uri="{D42A27DB-BD31-4B8C-83A1-F6EECF244321}">
-                <p14:modId xmlns:p14="http://schemas.microsoft.com/office/powerpoint/2010/main" val="3051123938"/>
+                <p14:modId xmlns:p14="http://schemas.microsoft.com/office/powerpoint/2010/main" val="3333411333"/>
               </p:ext>
             </p:extLst>
           </p:nvPr>
         </p:nvGraphicFramePr>
         <p:xfrm>
-          <a:off x="1189303" y="4437112"/>
-          <a:ext cx="1940857" cy="1112520"/>
+          <a:off x="1031450" y="4405629"/>
+          <a:ext cx="1452319" cy="1080120"/>
         </p:xfrm>
         <a:graphic>
           <a:graphicData uri="http://schemas.openxmlformats.org/drawingml/2006/table">
@@ -9200,11 +9858,11 @@
                 <a:tableStyleId>{073A0DAA-6AF3-43AB-8588-CEC1D06C72B9}</a:tableStyleId>
               </a:tblPr>
               <a:tblGrid>
-                <a:gridCol w="284673"/>
-                <a:gridCol w="432048"/>
-                <a:gridCol w="1224136"/>
+                <a:gridCol w="213018"/>
+                <a:gridCol w="216788"/>
+                <a:gridCol w="1022513"/>
               </a:tblGrid>
-              <a:tr h="370840">
+              <a:tr h="360040">
                 <a:tc>
                   <a:txBody>
                     <a:bodyPr/>
@@ -9278,7 +9936,7 @@
                   <a:tcPr marL="9525" marR="9525" marT="9525" marB="0" anchor="b"/>
                 </a:tc>
               </a:tr>
-              <a:tr h="370840">
+              <a:tr h="360040">
                 <a:tc>
                   <a:txBody>
                     <a:bodyPr/>
@@ -9334,13 +9992,13 @@
                     <a:p>
                       <a:pPr algn="ctr" fontAlgn="b"/>
                       <a:r>
-                        <a:rPr lang="en-CA" sz="1600" u="none" strike="noStrike">
+                        <a:rPr lang="en-CA" sz="1600" u="none" strike="noStrike" dirty="0">
                           <a:effectLst/>
                           <a:latin typeface="Calibri" panose="020F0502020204030204" pitchFamily="34" charset="0"/>
                         </a:rPr>
                         <a:t>4</a:t>
                       </a:r>
-                      <a:endParaRPr lang="en-CA" sz="1600" b="0" i="0" u="none" strike="noStrike">
+                      <a:endParaRPr lang="en-CA" sz="1600" b="0" i="0" u="none" strike="noStrike" dirty="0">
                         <a:solidFill>
                           <a:srgbClr val="000000"/>
                         </a:solidFill>
@@ -9352,7 +10010,7 @@
                   <a:tcPr marL="9525" marR="9525" marT="9525" marB="0" anchor="b"/>
                 </a:tc>
               </a:tr>
-              <a:tr h="370840">
+              <a:tr h="360040">
                 <a:tc>
                   <a:txBody>
                     <a:bodyPr/>
@@ -9438,8 +10096,8 @@
         </p:nvSpPr>
         <p:spPr>
           <a:xfrm>
-            <a:off x="1501877" y="3964414"/>
-            <a:ext cx="909883" cy="369332"/>
+            <a:off x="1174627" y="4002191"/>
+            <a:ext cx="1224136" cy="369332"/>
           </a:xfrm>
           <a:prstGeom prst="rect">
             <a:avLst/>
@@ -9470,7 +10128,11 @@
             </a:r>
             <a:r>
               <a:rPr lang="en-CA" dirty="0" smtClean="0"/>
-              <a:t> S </a:t>
+              <a:t> </a:t>
+            </a:r>
+            <a:r>
+              <a:rPr lang="en-CA" dirty="0" smtClean="0"/>
+              <a:t>M </a:t>
             </a:r>
             <a:endParaRPr lang="en-CA" dirty="0"/>
           </a:p>
@@ -9485,14 +10147,14 @@
           <p:nvPr>
             <p:extLst>
               <p:ext uri="{D42A27DB-BD31-4B8C-83A1-F6EECF244321}">
-                <p14:modId xmlns:p14="http://schemas.microsoft.com/office/powerpoint/2010/main" val="802288435"/>
+                <p14:modId xmlns:p14="http://schemas.microsoft.com/office/powerpoint/2010/main" val="2100823422"/>
               </p:ext>
             </p:extLst>
           </p:nvPr>
         </p:nvGraphicFramePr>
         <p:xfrm>
-          <a:off x="3133519" y="4437112"/>
-          <a:ext cx="1904853" cy="2252364"/>
+          <a:off x="2511643" y="4404801"/>
+          <a:ext cx="1391790" cy="1904519"/>
         </p:xfrm>
         <a:graphic>
           <a:graphicData uri="http://schemas.openxmlformats.org/drawingml/2006/table">
@@ -9501,11 +10163,11 @@
                 <a:tableStyleId>{073A0DAA-6AF3-43AB-8588-CEC1D06C72B9}</a:tableStyleId>
               </a:tblPr>
               <a:tblGrid>
-                <a:gridCol w="392685"/>
-                <a:gridCol w="432048"/>
-                <a:gridCol w="1080120"/>
+                <a:gridCol w="225007"/>
+                <a:gridCol w="222064"/>
+                <a:gridCol w="944719"/>
               </a:tblGrid>
-              <a:tr h="375394">
+              <a:tr h="224133">
                 <a:tc>
                   <a:txBody>
                     <a:bodyPr/>
@@ -9579,7 +10241,7 @@
                   <a:tcPr marL="9525" marR="9525" marT="9525" marB="0" anchor="b"/>
                 </a:tc>
               </a:tr>
-              <a:tr h="375394">
+              <a:tr h="326855">
                 <a:tc>
                   <a:txBody>
                     <a:bodyPr/>
@@ -9653,7 +10315,7 @@
                   <a:tcPr marL="9525" marR="9525" marT="9525" marB="0" anchor="b"/>
                 </a:tc>
               </a:tr>
-              <a:tr h="375394">
+              <a:tr h="323472">
                 <a:tc>
                   <a:txBody>
                     <a:bodyPr/>
@@ -9727,7 +10389,7 @@
                   <a:tcPr marL="9525" marR="9525" marT="9525" marB="0" anchor="b"/>
                 </a:tc>
               </a:tr>
-              <a:tr h="375394">
+              <a:tr h="323472">
                 <a:tc>
                   <a:txBody>
                     <a:bodyPr/>
@@ -9783,13 +10445,13 @@
                     <a:p>
                       <a:pPr algn="ctr" fontAlgn="b"/>
                       <a:r>
-                        <a:rPr lang="en-CA" sz="1600" u="none" strike="noStrike">
+                        <a:rPr lang="en-CA" sz="1600" u="none" strike="noStrike" dirty="0">
                           <a:effectLst/>
                           <a:latin typeface="Calibri" panose="020F0502020204030204" pitchFamily="34" charset="0"/>
                         </a:rPr>
                         <a:t>19</a:t>
                       </a:r>
-                      <a:endParaRPr lang="en-CA" sz="1600" b="0" i="0" u="none" strike="noStrike">
+                      <a:endParaRPr lang="en-CA" sz="1600" b="0" i="0" u="none" strike="noStrike" dirty="0">
                         <a:solidFill>
                           <a:srgbClr val="000000"/>
                         </a:solidFill>
@@ -9801,7 +10463,7 @@
                   <a:tcPr marL="9525" marR="9525" marT="9525" marB="0" anchor="b"/>
                 </a:tc>
               </a:tr>
-              <a:tr h="375394">
+              <a:tr h="323472">
                 <a:tc>
                   <a:txBody>
                     <a:bodyPr/>
@@ -9875,7 +10537,7 @@
                   <a:tcPr marL="9525" marR="9525" marT="9525" marB="0" anchor="b"/>
                 </a:tc>
               </a:tr>
-              <a:tr h="375394">
+              <a:tr h="353883">
                 <a:tc>
                   <a:txBody>
                     <a:bodyPr/>
@@ -9961,8 +10623,8 @@
         </p:nvSpPr>
         <p:spPr>
           <a:xfrm>
-            <a:off x="3491880" y="3964414"/>
-            <a:ext cx="1188132" cy="369332"/>
+            <a:off x="2699792" y="4035469"/>
+            <a:ext cx="1172484" cy="369332"/>
           </a:xfrm>
           <a:prstGeom prst="rect">
             <a:avLst/>
@@ -10002,14 +10664,14 @@
           <p:nvPr>
             <p:extLst>
               <p:ext uri="{D42A27DB-BD31-4B8C-83A1-F6EECF244321}">
-                <p14:modId xmlns:p14="http://schemas.microsoft.com/office/powerpoint/2010/main" val="761237289"/>
+                <p14:modId xmlns:p14="http://schemas.microsoft.com/office/powerpoint/2010/main" val="731890774"/>
               </p:ext>
             </p:extLst>
           </p:nvPr>
         </p:nvGraphicFramePr>
         <p:xfrm>
-          <a:off x="5088307" y="4437112"/>
-          <a:ext cx="3456384" cy="1964329"/>
+          <a:off x="3995936" y="4365105"/>
+          <a:ext cx="3240359" cy="1944216"/>
         </p:xfrm>
         <a:graphic>
           <a:graphicData uri="http://schemas.openxmlformats.org/drawingml/2006/table">
@@ -10018,13 +10680,13 @@
                 <a:tableStyleId>{073A0DAA-6AF3-43AB-8588-CEC1D06C72B9}</a:tableStyleId>
               </a:tblPr>
               <a:tblGrid>
-                <a:gridCol w="360040"/>
-                <a:gridCol w="432048"/>
-                <a:gridCol w="1224136"/>
-                <a:gridCol w="648072"/>
-                <a:gridCol w="792088"/>
+                <a:gridCol w="422646"/>
+                <a:gridCol w="421737"/>
+                <a:gridCol w="1060476"/>
+                <a:gridCol w="556182"/>
+                <a:gridCol w="779318"/>
               </a:tblGrid>
-              <a:tr h="367873">
+              <a:tr h="371923">
                 <a:tc>
                   <a:txBody>
                     <a:bodyPr/>
@@ -10036,7 +10698,7 @@
                           <a:effectLst/>
                           <a:latin typeface="Calibri" panose="020F0502020204030204" pitchFamily="34" charset="0"/>
                         </a:rPr>
-                        <a:t>S_z</a:t>
+                        <a:t>M_z</a:t>
                       </a:r>
                       <a:endParaRPr lang="en-CA" sz="1600" b="0" i="0" u="none" strike="noStrike" dirty="0">
                         <a:solidFill>
@@ -10060,7 +10722,7 @@
                           <a:effectLst/>
                           <a:latin typeface="Calibri" panose="020F0502020204030204" pitchFamily="34" charset="0"/>
                         </a:rPr>
-                        <a:t>S_y</a:t>
+                        <a:t>M_y</a:t>
                       </a:r>
                       <a:endParaRPr lang="en-CA" sz="1600" b="0" i="0" u="none" strike="noStrike" dirty="0">
                         <a:solidFill>
@@ -10080,11 +10742,109 @@
                     <a:p>
                       <a:pPr algn="ctr" fontAlgn="b"/>
                       <a:r>
+                        <a:rPr lang="en-CA" sz="1600" u="none" strike="noStrike" dirty="0" smtClean="0">
+                          <a:effectLst/>
+                          <a:latin typeface="Calibri" panose="020F0502020204030204" pitchFamily="34" charset="0"/>
+                        </a:rPr>
+                        <a:t>multiplicity</a:t>
+                      </a:r>
+                      <a:endParaRPr lang="en-CA" sz="1600" b="0" i="0" u="none" strike="noStrike" dirty="0">
+                        <a:solidFill>
+                          <a:srgbClr val="000000"/>
+                        </a:solidFill>
+                        <a:effectLst/>
+                        <a:latin typeface="Calibri" panose="020F0502020204030204" pitchFamily="34" charset="0"/>
+                      </a:endParaRPr>
+                    </a:p>
+                  </a:txBody>
+                  <a:tcPr marL="9525" marR="9525" marT="9525" marB="0" anchor="b"/>
+                </a:tc>
+                <a:tc>
+                  <a:txBody>
+                    <a:bodyPr/>
+                    <a:lstStyle/>
+                    <a:p>
+                      <a:pPr algn="ctr" fontAlgn="b"/>
+                      <a:r>
+                        <a:rPr lang="en-CA" sz="1600" u="none" strike="noStrike" dirty="0" err="1" smtClean="0">
+                          <a:effectLst/>
+                          <a:latin typeface="Calibri" panose="020F0502020204030204" pitchFamily="34" charset="0"/>
+                        </a:rPr>
+                        <a:t>T_R_a</a:t>
+                      </a:r>
+                      <a:endParaRPr lang="en-CA" sz="1600" b="0" i="0" u="none" strike="noStrike" dirty="0">
+                        <a:solidFill>
+                          <a:srgbClr val="000000"/>
+                        </a:solidFill>
+                        <a:effectLst/>
+                        <a:latin typeface="Calibri" panose="020F0502020204030204" pitchFamily="34" charset="0"/>
+                      </a:endParaRPr>
+                    </a:p>
+                  </a:txBody>
+                  <a:tcPr marL="9525" marR="9525" marT="9525" marB="0" anchor="b"/>
+                </a:tc>
+                <a:tc>
+                  <a:txBody>
+                    <a:bodyPr/>
+                    <a:lstStyle/>
+                    <a:p>
+                      <a:pPr algn="ctr" fontAlgn="b"/>
+                      <a:r>
+                        <a:rPr lang="en-CA" sz="1600" u="none" strike="noStrike" dirty="0" err="1" smtClean="0">
+                          <a:effectLst/>
+                          <a:latin typeface="Calibri" panose="020F0502020204030204" pitchFamily="34" charset="0"/>
+                        </a:rPr>
+                        <a:t>T_R_b</a:t>
+                      </a:r>
+                      <a:endParaRPr lang="en-CA" sz="1600" b="0" i="0" u="none" strike="noStrike" dirty="0">
+                        <a:solidFill>
+                          <a:srgbClr val="000000"/>
+                        </a:solidFill>
+                        <a:effectLst/>
+                        <a:latin typeface="Calibri" panose="020F0502020204030204" pitchFamily="34" charset="0"/>
+                      </a:endParaRPr>
+                    </a:p>
+                  </a:txBody>
+                  <a:tcPr marL="9525" marR="9525" marT="9525" marB="0" anchor="b"/>
+                </a:tc>
+              </a:tr>
+              <a:tr h="396544">
+                <a:tc>
+                  <a:txBody>
+                    <a:bodyPr/>
+                    <a:lstStyle/>
+                    <a:p>
+                      <a:pPr algn="ctr" fontAlgn="b"/>
+                      <a:r>
+                        <a:rPr lang="en-CA" sz="1600" u="none" strike="noStrike">
+                          <a:effectLst/>
+                          <a:latin typeface="Calibri" panose="020F0502020204030204" pitchFamily="34" charset="0"/>
+                        </a:rPr>
+                        <a:t>2</a:t>
+                      </a:r>
+                      <a:endParaRPr lang="en-CA" sz="1600" b="0" i="0" u="none" strike="noStrike">
+                        <a:solidFill>
+                          <a:srgbClr val="000000"/>
+                        </a:solidFill>
+                        <a:effectLst/>
+                        <a:latin typeface="Calibri" panose="020F0502020204030204" pitchFamily="34" charset="0"/>
+                      </a:endParaRPr>
+                    </a:p>
+                  </a:txBody>
+                  <a:tcPr marL="9525" marR="9525" marT="9525" marB="0" anchor="b"/>
+                </a:tc>
+                <a:tc>
+                  <a:txBody>
+                    <a:bodyPr/>
+                    <a:lstStyle/>
+                    <a:p>
+                      <a:pPr algn="ctr" fontAlgn="b"/>
+                      <a:r>
                         <a:rPr lang="en-CA" sz="1600" u="none" strike="noStrike" dirty="0">
                           <a:effectLst/>
                           <a:latin typeface="Calibri" panose="020F0502020204030204" pitchFamily="34" charset="0"/>
                         </a:rPr>
-                        <a:t>multiplicity</a:t>
+                        <a:t>c</a:t>
                       </a:r>
                       <a:endParaRPr lang="en-CA" sz="1600" b="0" i="0" u="none" strike="noStrike" dirty="0">
                         <a:solidFill>
@@ -10104,11 +10864,11 @@
                     <a:p>
                       <a:pPr algn="ctr" fontAlgn="b"/>
                       <a:r>
-                        <a:rPr lang="en-CA" sz="1600" u="none" strike="noStrike" dirty="0" err="1" smtClean="0">
-                          <a:effectLst/>
-                          <a:latin typeface="Calibri" panose="020F0502020204030204" pitchFamily="34" charset="0"/>
-                        </a:rPr>
-                        <a:t>T_R_a</a:t>
+                        <a:rPr lang="en-CA" sz="1600" u="none" strike="noStrike" dirty="0">
+                          <a:effectLst/>
+                          <a:latin typeface="Calibri" panose="020F0502020204030204" pitchFamily="34" charset="0"/>
+                        </a:rPr>
+                        <a:t>24</a:t>
                       </a:r>
                       <a:endParaRPr lang="en-CA" sz="1600" b="0" i="0" u="none" strike="noStrike" dirty="0">
                         <a:solidFill>
@@ -10128,11 +10888,35 @@
                     <a:p>
                       <a:pPr algn="ctr" fontAlgn="b"/>
                       <a:r>
-                        <a:rPr lang="en-CA" sz="1600" u="none" strike="noStrike" dirty="0" err="1" smtClean="0">
-                          <a:effectLst/>
-                          <a:latin typeface="Calibri" panose="020F0502020204030204" pitchFamily="34" charset="0"/>
-                        </a:rPr>
-                        <a:t>T_R_b</a:t>
+                        <a:rPr lang="en-CA" sz="1600" u="none" strike="noStrike">
+                          <a:effectLst/>
+                          <a:latin typeface="Calibri" panose="020F0502020204030204" pitchFamily="34" charset="0"/>
+                        </a:rPr>
+                        <a:t>2</a:t>
+                      </a:r>
+                      <a:endParaRPr lang="en-CA" sz="1600" b="0" i="0" u="none" strike="noStrike">
+                        <a:solidFill>
+                          <a:srgbClr val="000000"/>
+                        </a:solidFill>
+                        <a:effectLst/>
+                        <a:latin typeface="Calibri" panose="020F0502020204030204" pitchFamily="34" charset="0"/>
+                      </a:endParaRPr>
+                    </a:p>
+                  </a:txBody>
+                  <a:tcPr marL="9525" marR="9525" marT="9525" marB="0" anchor="b"/>
+                </a:tc>
+                <a:tc>
+                  <a:txBody>
+                    <a:bodyPr/>
+                    <a:lstStyle/>
+                    <a:p>
+                      <a:pPr algn="ctr" fontAlgn="b"/>
+                      <a:r>
+                        <a:rPr lang="en-CA" sz="1600" u="none" strike="noStrike" dirty="0">
+                          <a:effectLst/>
+                          <a:latin typeface="Calibri" panose="020F0502020204030204" pitchFamily="34" charset="0"/>
+                        </a:rPr>
+                        <a:t>6</a:t>
                       </a:r>
                       <a:endParaRPr lang="en-CA" sz="1600" b="0" i="0" u="none" strike="noStrike" dirty="0">
                         <a:solidFill>
@@ -10146,7 +10930,7 @@
                   <a:tcPr marL="9525" marR="9525" marT="9525" marB="0" anchor="b"/>
                 </a:tc>
               </a:tr>
-              <a:tr h="399114">
+              <a:tr h="382661">
                 <a:tc>
                   <a:txBody>
                     <a:bodyPr/>
@@ -10202,13 +10986,13 @@
                     <a:p>
                       <a:pPr algn="ctr" fontAlgn="b"/>
                       <a:r>
-                        <a:rPr lang="en-CA" sz="1600" u="none" strike="noStrike">
-                          <a:effectLst/>
-                          <a:latin typeface="Calibri" panose="020F0502020204030204" pitchFamily="34" charset="0"/>
-                        </a:rPr>
-                        <a:t>24</a:t>
-                      </a:r>
-                      <a:endParaRPr lang="en-CA" sz="1600" b="0" i="0" u="none" strike="noStrike">
+                        <a:rPr lang="en-CA" sz="1600" u="none" strike="noStrike" dirty="0">
+                          <a:effectLst/>
+                          <a:latin typeface="Calibri" panose="020F0502020204030204" pitchFamily="34" charset="0"/>
+                        </a:rPr>
+                        <a:t>76</a:t>
+                      </a:r>
+                      <a:endParaRPr lang="en-CA" sz="1600" b="0" i="0" u="none" strike="noStrike" dirty="0">
                         <a:solidFill>
                           <a:srgbClr val="000000"/>
                         </a:solidFill>
@@ -10250,12 +11034,208 @@
                     <a:p>
                       <a:pPr algn="ctr" fontAlgn="b"/>
                       <a:r>
+                        <a:rPr lang="en-CA" sz="1600" u="none" strike="noStrike">
+                          <a:effectLst/>
+                          <a:latin typeface="Calibri" panose="020F0502020204030204" pitchFamily="34" charset="0"/>
+                        </a:rPr>
+                        <a:t>9</a:t>
+                      </a:r>
+                      <a:endParaRPr lang="en-CA" sz="1600" b="0" i="0" u="none" strike="noStrike">
+                        <a:solidFill>
+                          <a:srgbClr val="000000"/>
+                        </a:solidFill>
+                        <a:effectLst/>
+                        <a:latin typeface="Calibri" panose="020F0502020204030204" pitchFamily="34" charset="0"/>
+                      </a:endParaRPr>
+                    </a:p>
+                  </a:txBody>
+                  <a:tcPr marL="9525" marR="9525" marT="9525" marB="0" anchor="b"/>
+                </a:tc>
+              </a:tr>
+              <a:tr h="396544">
+                <a:tc>
+                  <a:txBody>
+                    <a:bodyPr/>
+                    <a:lstStyle/>
+                    <a:p>
+                      <a:pPr algn="ctr" fontAlgn="b"/>
+                      <a:r>
+                        <a:rPr lang="en-CA" sz="1600" u="none" strike="noStrike">
+                          <a:effectLst/>
+                          <a:latin typeface="Calibri" panose="020F0502020204030204" pitchFamily="34" charset="0"/>
+                        </a:rPr>
+                        <a:t>2</a:t>
+                      </a:r>
+                      <a:endParaRPr lang="en-CA" sz="1600" b="0" i="0" u="none" strike="noStrike">
+                        <a:solidFill>
+                          <a:srgbClr val="000000"/>
+                        </a:solidFill>
+                        <a:effectLst/>
+                        <a:latin typeface="Calibri" panose="020F0502020204030204" pitchFamily="34" charset="0"/>
+                      </a:endParaRPr>
+                    </a:p>
+                  </a:txBody>
+                  <a:tcPr marL="9525" marR="9525" marT="9525" marB="0" anchor="b"/>
+                </a:tc>
+                <a:tc>
+                  <a:txBody>
+                    <a:bodyPr/>
+                    <a:lstStyle/>
+                    <a:p>
+                      <a:pPr algn="ctr" fontAlgn="b"/>
+                      <a:r>
+                        <a:rPr lang="en-CA" sz="1600" u="none" strike="noStrike">
+                          <a:effectLst/>
+                          <a:latin typeface="Calibri" panose="020F0502020204030204" pitchFamily="34" charset="0"/>
+                        </a:rPr>
+                        <a:t>d</a:t>
+                      </a:r>
+                      <a:endParaRPr lang="en-CA" sz="1600" b="0" i="0" u="none" strike="noStrike">
+                        <a:solidFill>
+                          <a:srgbClr val="000000"/>
+                        </a:solidFill>
+                        <a:effectLst/>
+                        <a:latin typeface="Calibri" panose="020F0502020204030204" pitchFamily="34" charset="0"/>
+                      </a:endParaRPr>
+                    </a:p>
+                  </a:txBody>
+                  <a:tcPr marL="9525" marR="9525" marT="9525" marB="0" anchor="b"/>
+                </a:tc>
+                <a:tc>
+                  <a:txBody>
+                    <a:bodyPr/>
+                    <a:lstStyle/>
+                    <a:p>
+                      <a:pPr algn="ctr" fontAlgn="b"/>
+                      <a:r>
+                        <a:rPr lang="en-CA" sz="1600" u="none" strike="noStrike">
+                          <a:effectLst/>
+                          <a:latin typeface="Calibri" panose="020F0502020204030204" pitchFamily="34" charset="0"/>
+                        </a:rPr>
+                        <a:t>48</a:t>
+                      </a:r>
+                      <a:endParaRPr lang="en-CA" sz="1600" b="0" i="0" u="none" strike="noStrike">
+                        <a:solidFill>
+                          <a:srgbClr val="000000"/>
+                        </a:solidFill>
+                        <a:effectLst/>
+                        <a:latin typeface="Calibri" panose="020F0502020204030204" pitchFamily="34" charset="0"/>
+                      </a:endParaRPr>
+                    </a:p>
+                  </a:txBody>
+                  <a:tcPr marL="9525" marR="9525" marT="9525" marB="0" anchor="b"/>
+                </a:tc>
+                <a:tc>
+                  <a:txBody>
+                    <a:bodyPr/>
+                    <a:lstStyle/>
+                    <a:p>
+                      <a:pPr algn="ctr" fontAlgn="b"/>
+                      <a:r>
                         <a:rPr lang="en-CA" sz="1600" u="none" strike="noStrike" dirty="0">
                           <a:effectLst/>
                           <a:latin typeface="Calibri" panose="020F0502020204030204" pitchFamily="34" charset="0"/>
                         </a:rPr>
+                        <a:t>2</a:t>
+                      </a:r>
+                      <a:endParaRPr lang="en-CA" sz="1600" b="0" i="0" u="none" strike="noStrike" dirty="0">
+                        <a:solidFill>
+                          <a:srgbClr val="000000"/>
+                        </a:solidFill>
+                        <a:effectLst/>
+                        <a:latin typeface="Calibri" panose="020F0502020204030204" pitchFamily="34" charset="0"/>
+                      </a:endParaRPr>
+                    </a:p>
+                  </a:txBody>
+                  <a:tcPr marL="9525" marR="9525" marT="9525" marB="0" anchor="b"/>
+                </a:tc>
+                <a:tc>
+                  <a:txBody>
+                    <a:bodyPr/>
+                    <a:lstStyle/>
+                    <a:p>
+                      <a:pPr algn="ctr" fontAlgn="b"/>
+                      <a:r>
+                        <a:rPr lang="en-CA" sz="1600" u="none" strike="noStrike">
+                          <a:effectLst/>
+                          <a:latin typeface="Calibri" panose="020F0502020204030204" pitchFamily="34" charset="0"/>
+                        </a:rPr>
                         <a:t>6</a:t>
                       </a:r>
+                      <a:endParaRPr lang="en-CA" sz="1600" b="0" i="0" u="none" strike="noStrike">
+                        <a:solidFill>
+                          <a:srgbClr val="000000"/>
+                        </a:solidFill>
+                        <a:effectLst/>
+                        <a:latin typeface="Calibri" panose="020F0502020204030204" pitchFamily="34" charset="0"/>
+                      </a:endParaRPr>
+                    </a:p>
+                  </a:txBody>
+                  <a:tcPr marL="9525" marR="9525" marT="9525" marB="0" anchor="b"/>
+                </a:tc>
+              </a:tr>
+              <a:tr h="396544">
+                <a:tc>
+                  <a:txBody>
+                    <a:bodyPr/>
+                    <a:lstStyle/>
+                    <a:p>
+                      <a:pPr algn="ctr" fontAlgn="b"/>
+                      <a:r>
+                        <a:rPr lang="en-CA" sz="1600" u="none" strike="noStrike">
+                          <a:effectLst/>
+                          <a:latin typeface="Calibri" panose="020F0502020204030204" pitchFamily="34" charset="0"/>
+                        </a:rPr>
+                        <a:t>2</a:t>
+                      </a:r>
+                      <a:endParaRPr lang="en-CA" sz="1600" b="0" i="0" u="none" strike="noStrike">
+                        <a:solidFill>
+                          <a:srgbClr val="000000"/>
+                        </a:solidFill>
+                        <a:effectLst/>
+                        <a:latin typeface="Calibri" panose="020F0502020204030204" pitchFamily="34" charset="0"/>
+                      </a:endParaRPr>
+                    </a:p>
+                  </a:txBody>
+                  <a:tcPr marL="9525" marR="9525" marT="9525" marB="0" anchor="b"/>
+                </a:tc>
+                <a:tc>
+                  <a:txBody>
+                    <a:bodyPr/>
+                    <a:lstStyle/>
+                    <a:p>
+                      <a:pPr algn="ctr" fontAlgn="b"/>
+                      <a:r>
+                        <a:rPr lang="en-CA" sz="1600" u="none" strike="noStrike">
+                          <a:effectLst/>
+                          <a:latin typeface="Calibri" panose="020F0502020204030204" pitchFamily="34" charset="0"/>
+                        </a:rPr>
+                        <a:t>d</a:t>
+                      </a:r>
+                      <a:endParaRPr lang="en-CA" sz="1600" b="0" i="0" u="none" strike="noStrike">
+                        <a:solidFill>
+                          <a:srgbClr val="000000"/>
+                        </a:solidFill>
+                        <a:effectLst/>
+                        <a:latin typeface="Calibri" panose="020F0502020204030204" pitchFamily="34" charset="0"/>
+                      </a:endParaRPr>
+                    </a:p>
+                  </a:txBody>
+                  <a:tcPr marL="9525" marR="9525" marT="9525" marB="0" anchor="b"/>
+                </a:tc>
+                <a:tc>
+                  <a:txBody>
+                    <a:bodyPr/>
+                    <a:lstStyle/>
+                    <a:p>
+                      <a:pPr algn="ctr" fontAlgn="b"/>
+                      <a:r>
+                        <a:rPr lang="en-CA" sz="1600" u="none" strike="noStrike" dirty="0">
+                          <a:effectLst/>
+                          <a:latin typeface="Calibri" panose="020F0502020204030204" pitchFamily="34" charset="0"/>
+                        </a:rPr>
+                        <a:t>152</a:t>
+                      </a:r>
                       <a:endParaRPr lang="en-CA" sz="1600" b="0" i="0" u="none" strike="noStrike" dirty="0">
                         <a:solidFill>
                           <a:srgbClr val="000000"/>
@@ -10267,338 +11247,20 @@
                   </a:txBody>
                   <a:tcPr marL="9525" marR="9525" marT="9525" marB="0" anchor="b"/>
                 </a:tc>
-              </a:tr>
-              <a:tr h="399114">
-                <a:tc>
-                  <a:txBody>
-                    <a:bodyPr/>
-                    <a:lstStyle/>
-                    <a:p>
-                      <a:pPr algn="ctr" fontAlgn="b"/>
-                      <a:r>
-                        <a:rPr lang="en-CA" sz="1600" u="none" strike="noStrike">
+                <a:tc>
+                  <a:txBody>
+                    <a:bodyPr/>
+                    <a:lstStyle/>
+                    <a:p>
+                      <a:pPr algn="ctr" fontAlgn="b"/>
+                      <a:r>
+                        <a:rPr lang="en-CA" sz="1600" u="none" strike="noStrike" dirty="0">
                           <a:effectLst/>
                           <a:latin typeface="Calibri" panose="020F0502020204030204" pitchFamily="34" charset="0"/>
                         </a:rPr>
                         <a:t>2</a:t>
                       </a:r>
-                      <a:endParaRPr lang="en-CA" sz="1600" b="0" i="0" u="none" strike="noStrike">
-                        <a:solidFill>
-                          <a:srgbClr val="000000"/>
-                        </a:solidFill>
-                        <a:effectLst/>
-                        <a:latin typeface="Calibri" panose="020F0502020204030204" pitchFamily="34" charset="0"/>
-                      </a:endParaRPr>
-                    </a:p>
-                  </a:txBody>
-                  <a:tcPr marL="9525" marR="9525" marT="9525" marB="0" anchor="b"/>
-                </a:tc>
-                <a:tc>
-                  <a:txBody>
-                    <a:bodyPr/>
-                    <a:lstStyle/>
-                    <a:p>
-                      <a:pPr algn="ctr" fontAlgn="b"/>
-                      <a:r>
-                        <a:rPr lang="en-CA" sz="1600" u="none" strike="noStrike">
-                          <a:effectLst/>
-                          <a:latin typeface="Calibri" panose="020F0502020204030204" pitchFamily="34" charset="0"/>
-                        </a:rPr>
-                        <a:t>c</a:t>
-                      </a:r>
-                      <a:endParaRPr lang="en-CA" sz="1600" b="0" i="0" u="none" strike="noStrike">
-                        <a:solidFill>
-                          <a:srgbClr val="000000"/>
-                        </a:solidFill>
-                        <a:effectLst/>
-                        <a:latin typeface="Calibri" panose="020F0502020204030204" pitchFamily="34" charset="0"/>
-                      </a:endParaRPr>
-                    </a:p>
-                  </a:txBody>
-                  <a:tcPr marL="9525" marR="9525" marT="9525" marB="0" anchor="b"/>
-                </a:tc>
-                <a:tc>
-                  <a:txBody>
-                    <a:bodyPr/>
-                    <a:lstStyle/>
-                    <a:p>
-                      <a:pPr algn="ctr" fontAlgn="b"/>
-                      <a:r>
-                        <a:rPr lang="en-CA" sz="1600" u="none" strike="noStrike">
-                          <a:effectLst/>
-                          <a:latin typeface="Calibri" panose="020F0502020204030204" pitchFamily="34" charset="0"/>
-                        </a:rPr>
-                        <a:t>76</a:t>
-                      </a:r>
-                      <a:endParaRPr lang="en-CA" sz="1600" b="0" i="0" u="none" strike="noStrike">
-                        <a:solidFill>
-                          <a:srgbClr val="000000"/>
-                        </a:solidFill>
-                        <a:effectLst/>
-                        <a:latin typeface="Calibri" panose="020F0502020204030204" pitchFamily="34" charset="0"/>
-                      </a:endParaRPr>
-                    </a:p>
-                  </a:txBody>
-                  <a:tcPr marL="9525" marR="9525" marT="9525" marB="0" anchor="b"/>
-                </a:tc>
-                <a:tc>
-                  <a:txBody>
-                    <a:bodyPr/>
-                    <a:lstStyle/>
-                    <a:p>
-                      <a:pPr algn="ctr" fontAlgn="b"/>
-                      <a:r>
-                        <a:rPr lang="en-CA" sz="1600" u="none" strike="noStrike">
-                          <a:effectLst/>
-                          <a:latin typeface="Calibri" panose="020F0502020204030204" pitchFamily="34" charset="0"/>
-                        </a:rPr>
-                        <a:t>2</a:t>
-                      </a:r>
-                      <a:endParaRPr lang="en-CA" sz="1600" b="0" i="0" u="none" strike="noStrike">
-                        <a:solidFill>
-                          <a:srgbClr val="000000"/>
-                        </a:solidFill>
-                        <a:effectLst/>
-                        <a:latin typeface="Calibri" panose="020F0502020204030204" pitchFamily="34" charset="0"/>
-                      </a:endParaRPr>
-                    </a:p>
-                  </a:txBody>
-                  <a:tcPr marL="9525" marR="9525" marT="9525" marB="0" anchor="b"/>
-                </a:tc>
-                <a:tc>
-                  <a:txBody>
-                    <a:bodyPr/>
-                    <a:lstStyle/>
-                    <a:p>
-                      <a:pPr algn="ctr" fontAlgn="b"/>
-                      <a:r>
-                        <a:rPr lang="en-CA" sz="1600" u="none" strike="noStrike">
-                          <a:effectLst/>
-                          <a:latin typeface="Calibri" panose="020F0502020204030204" pitchFamily="34" charset="0"/>
-                        </a:rPr>
-                        <a:t>9</a:t>
-                      </a:r>
-                      <a:endParaRPr lang="en-CA" sz="1600" b="0" i="0" u="none" strike="noStrike">
-                        <a:solidFill>
-                          <a:srgbClr val="000000"/>
-                        </a:solidFill>
-                        <a:effectLst/>
-                        <a:latin typeface="Calibri" panose="020F0502020204030204" pitchFamily="34" charset="0"/>
-                      </a:endParaRPr>
-                    </a:p>
-                  </a:txBody>
-                  <a:tcPr marL="9525" marR="9525" marT="9525" marB="0" anchor="b"/>
-                </a:tc>
-              </a:tr>
-              <a:tr h="399114">
-                <a:tc>
-                  <a:txBody>
-                    <a:bodyPr/>
-                    <a:lstStyle/>
-                    <a:p>
-                      <a:pPr algn="ctr" fontAlgn="b"/>
-                      <a:r>
-                        <a:rPr lang="en-CA" sz="1600" u="none" strike="noStrike">
-                          <a:effectLst/>
-                          <a:latin typeface="Calibri" panose="020F0502020204030204" pitchFamily="34" charset="0"/>
-                        </a:rPr>
-                        <a:t>2</a:t>
-                      </a:r>
-                      <a:endParaRPr lang="en-CA" sz="1600" b="0" i="0" u="none" strike="noStrike">
-                        <a:solidFill>
-                          <a:srgbClr val="000000"/>
-                        </a:solidFill>
-                        <a:effectLst/>
-                        <a:latin typeface="Calibri" panose="020F0502020204030204" pitchFamily="34" charset="0"/>
-                      </a:endParaRPr>
-                    </a:p>
-                  </a:txBody>
-                  <a:tcPr marL="9525" marR="9525" marT="9525" marB="0" anchor="b"/>
-                </a:tc>
-                <a:tc>
-                  <a:txBody>
-                    <a:bodyPr/>
-                    <a:lstStyle/>
-                    <a:p>
-                      <a:pPr algn="ctr" fontAlgn="b"/>
-                      <a:r>
-                        <a:rPr lang="en-CA" sz="1600" u="none" strike="noStrike">
-                          <a:effectLst/>
-                          <a:latin typeface="Calibri" panose="020F0502020204030204" pitchFamily="34" charset="0"/>
-                        </a:rPr>
-                        <a:t>d</a:t>
-                      </a:r>
-                      <a:endParaRPr lang="en-CA" sz="1600" b="0" i="0" u="none" strike="noStrike">
-                        <a:solidFill>
-                          <a:srgbClr val="000000"/>
-                        </a:solidFill>
-                        <a:effectLst/>
-                        <a:latin typeface="Calibri" panose="020F0502020204030204" pitchFamily="34" charset="0"/>
-                      </a:endParaRPr>
-                    </a:p>
-                  </a:txBody>
-                  <a:tcPr marL="9525" marR="9525" marT="9525" marB="0" anchor="b"/>
-                </a:tc>
-                <a:tc>
-                  <a:txBody>
-                    <a:bodyPr/>
-                    <a:lstStyle/>
-                    <a:p>
-                      <a:pPr algn="ctr" fontAlgn="b"/>
-                      <a:r>
-                        <a:rPr lang="en-CA" sz="1600" u="none" strike="noStrike">
-                          <a:effectLst/>
-                          <a:latin typeface="Calibri" panose="020F0502020204030204" pitchFamily="34" charset="0"/>
-                        </a:rPr>
-                        <a:t>48</a:t>
-                      </a:r>
-                      <a:endParaRPr lang="en-CA" sz="1600" b="0" i="0" u="none" strike="noStrike">
-                        <a:solidFill>
-                          <a:srgbClr val="000000"/>
-                        </a:solidFill>
-                        <a:effectLst/>
-                        <a:latin typeface="Calibri" panose="020F0502020204030204" pitchFamily="34" charset="0"/>
-                      </a:endParaRPr>
-                    </a:p>
-                  </a:txBody>
-                  <a:tcPr marL="9525" marR="9525" marT="9525" marB="0" anchor="b"/>
-                </a:tc>
-                <a:tc>
-                  <a:txBody>
-                    <a:bodyPr/>
-                    <a:lstStyle/>
-                    <a:p>
-                      <a:pPr algn="ctr" fontAlgn="b"/>
-                      <a:r>
-                        <a:rPr lang="en-CA" sz="1600" u="none" strike="noStrike">
-                          <a:effectLst/>
-                          <a:latin typeface="Calibri" panose="020F0502020204030204" pitchFamily="34" charset="0"/>
-                        </a:rPr>
-                        <a:t>2</a:t>
-                      </a:r>
-                      <a:endParaRPr lang="en-CA" sz="1600" b="0" i="0" u="none" strike="noStrike">
-                        <a:solidFill>
-                          <a:srgbClr val="000000"/>
-                        </a:solidFill>
-                        <a:effectLst/>
-                        <a:latin typeface="Calibri" panose="020F0502020204030204" pitchFamily="34" charset="0"/>
-                      </a:endParaRPr>
-                    </a:p>
-                  </a:txBody>
-                  <a:tcPr marL="9525" marR="9525" marT="9525" marB="0" anchor="b"/>
-                </a:tc>
-                <a:tc>
-                  <a:txBody>
-                    <a:bodyPr/>
-                    <a:lstStyle/>
-                    <a:p>
-                      <a:pPr algn="ctr" fontAlgn="b"/>
-                      <a:r>
-                        <a:rPr lang="en-CA" sz="1600" u="none" strike="noStrike">
-                          <a:effectLst/>
-                          <a:latin typeface="Calibri" panose="020F0502020204030204" pitchFamily="34" charset="0"/>
-                        </a:rPr>
-                        <a:t>6</a:t>
-                      </a:r>
-                      <a:endParaRPr lang="en-CA" sz="1600" b="0" i="0" u="none" strike="noStrike">
-                        <a:solidFill>
-                          <a:srgbClr val="000000"/>
-                        </a:solidFill>
-                        <a:effectLst/>
-                        <a:latin typeface="Calibri" panose="020F0502020204030204" pitchFamily="34" charset="0"/>
-                      </a:endParaRPr>
-                    </a:p>
-                  </a:txBody>
-                  <a:tcPr marL="9525" marR="9525" marT="9525" marB="0" anchor="b"/>
-                </a:tc>
-              </a:tr>
-              <a:tr h="399114">
-                <a:tc>
-                  <a:txBody>
-                    <a:bodyPr/>
-                    <a:lstStyle/>
-                    <a:p>
-                      <a:pPr algn="ctr" fontAlgn="b"/>
-                      <a:r>
-                        <a:rPr lang="en-CA" sz="1600" u="none" strike="noStrike">
-                          <a:effectLst/>
-                          <a:latin typeface="Calibri" panose="020F0502020204030204" pitchFamily="34" charset="0"/>
-                        </a:rPr>
-                        <a:t>2</a:t>
-                      </a:r>
-                      <a:endParaRPr lang="en-CA" sz="1600" b="0" i="0" u="none" strike="noStrike">
-                        <a:solidFill>
-                          <a:srgbClr val="000000"/>
-                        </a:solidFill>
-                        <a:effectLst/>
-                        <a:latin typeface="Calibri" panose="020F0502020204030204" pitchFamily="34" charset="0"/>
-                      </a:endParaRPr>
-                    </a:p>
-                  </a:txBody>
-                  <a:tcPr marL="9525" marR="9525" marT="9525" marB="0" anchor="b"/>
-                </a:tc>
-                <a:tc>
-                  <a:txBody>
-                    <a:bodyPr/>
-                    <a:lstStyle/>
-                    <a:p>
-                      <a:pPr algn="ctr" fontAlgn="b"/>
-                      <a:r>
-                        <a:rPr lang="en-CA" sz="1600" u="none" strike="noStrike">
-                          <a:effectLst/>
-                          <a:latin typeface="Calibri" panose="020F0502020204030204" pitchFamily="34" charset="0"/>
-                        </a:rPr>
-                        <a:t>d</a:t>
-                      </a:r>
-                      <a:endParaRPr lang="en-CA" sz="1600" b="0" i="0" u="none" strike="noStrike">
-                        <a:solidFill>
-                          <a:srgbClr val="000000"/>
-                        </a:solidFill>
-                        <a:effectLst/>
-                        <a:latin typeface="Calibri" panose="020F0502020204030204" pitchFamily="34" charset="0"/>
-                      </a:endParaRPr>
-                    </a:p>
-                  </a:txBody>
-                  <a:tcPr marL="9525" marR="9525" marT="9525" marB="0" anchor="b"/>
-                </a:tc>
-                <a:tc>
-                  <a:txBody>
-                    <a:bodyPr/>
-                    <a:lstStyle/>
-                    <a:p>
-                      <a:pPr algn="ctr" fontAlgn="b"/>
-                      <a:r>
-                        <a:rPr lang="en-CA" sz="1600" u="none" strike="noStrike" dirty="0">
-                          <a:effectLst/>
-                          <a:latin typeface="Calibri" panose="020F0502020204030204" pitchFamily="34" charset="0"/>
-                        </a:rPr>
-                        <a:t>152</a:t>
-                      </a:r>
                       <a:endParaRPr lang="en-CA" sz="1600" b="0" i="0" u="none" strike="noStrike" dirty="0">
-                        <a:solidFill>
-                          <a:srgbClr val="000000"/>
-                        </a:solidFill>
-                        <a:effectLst/>
-                        <a:latin typeface="Calibri" panose="020F0502020204030204" pitchFamily="34" charset="0"/>
-                      </a:endParaRPr>
-                    </a:p>
-                  </a:txBody>
-                  <a:tcPr marL="9525" marR="9525" marT="9525" marB="0" anchor="b"/>
-                </a:tc>
-                <a:tc>
-                  <a:txBody>
-                    <a:bodyPr/>
-                    <a:lstStyle/>
-                    <a:p>
-                      <a:pPr algn="ctr" fontAlgn="b"/>
-                      <a:r>
-                        <a:rPr lang="en-CA" sz="1600" u="none" strike="noStrike">
-                          <a:effectLst/>
-                          <a:latin typeface="Calibri" panose="020F0502020204030204" pitchFamily="34" charset="0"/>
-                        </a:rPr>
-                        <a:t>2</a:t>
-                      </a:r>
-                      <a:endParaRPr lang="en-CA" sz="1600" b="0" i="0" u="none" strike="noStrike">
                         <a:solidFill>
                           <a:srgbClr val="000000"/>
                         </a:solidFill>
@@ -10646,7 +11308,7 @@
         </p:nvSpPr>
         <p:spPr>
           <a:xfrm>
-            <a:off x="5436096" y="3964414"/>
+            <a:off x="4369118" y="3995678"/>
             <a:ext cx="3096344" cy="369332"/>
           </a:xfrm>
           <a:prstGeom prst="rect">
@@ -10682,7 +11344,15 @@
             </a:r>
             <a:r>
               <a:rPr lang="en-CA" dirty="0" smtClean="0"/>
-              <a:t> S  ⋈ </a:t>
+              <a:t> </a:t>
+            </a:r>
+            <a:r>
+              <a:rPr lang="en-CA" dirty="0" smtClean="0"/>
+              <a:t>M  </a:t>
+            </a:r>
+            <a:r>
+              <a:rPr lang="en-CA" dirty="0" smtClean="0"/>
+              <a:t>⋈ </a:t>
             </a:r>
             <a:r>
               <a:rPr lang="en-CA" baseline="-25000" dirty="0" smtClean="0"/>
@@ -10706,6 +11376,150 @@
           </a:p>
         </p:txBody>
       </p:sp>
+      <p:graphicFrame>
+        <p:nvGraphicFramePr>
+          <p:cNvPr id="2" name="Table 1"/>
+          <p:cNvGraphicFramePr>
+            <a:graphicFrameLocks noGrp="1"/>
+          </p:cNvGraphicFramePr>
+          <p:nvPr>
+            <p:extLst>
+              <p:ext uri="{D42A27DB-BD31-4B8C-83A1-F6EECF244321}">
+                <p14:modId xmlns:p14="http://schemas.microsoft.com/office/powerpoint/2010/main" val="3762302679"/>
+              </p:ext>
+            </p:extLst>
+          </p:nvPr>
+        </p:nvGraphicFramePr>
+        <p:xfrm>
+          <a:off x="7239566" y="4365010"/>
+          <a:ext cx="1872208" cy="670560"/>
+        </p:xfrm>
+        <a:graphic>
+          <a:graphicData uri="http://schemas.openxmlformats.org/drawingml/2006/table">
+            <a:tbl>
+              <a:tblPr firstRow="1" bandRow="1">
+                <a:tableStyleId>{073A0DAA-6AF3-43AB-8588-CEC1D06C72B9}</a:tableStyleId>
+              </a:tblPr>
+              <a:tblGrid>
+                <a:gridCol w="1152128"/>
+                <a:gridCol w="720080"/>
+              </a:tblGrid>
+              <a:tr h="302969">
+                <a:tc>
+                  <a:txBody>
+                    <a:bodyPr/>
+                    <a:lstStyle/>
+                    <a:p>
+                      <a:r>
+                        <a:rPr lang="en-US" sz="1600" dirty="0" smtClean="0">
+                          <a:latin typeface="Calibri" panose="020F0502020204030204" pitchFamily="34" charset="0"/>
+                        </a:rPr>
+                        <a:t>multiplicity</a:t>
+                      </a:r>
+                      <a:endParaRPr lang="en-CA" sz="1600" dirty="0">
+                        <a:latin typeface="Calibri" panose="020F0502020204030204" pitchFamily="34" charset="0"/>
+                      </a:endParaRPr>
+                    </a:p>
+                  </a:txBody>
+                  <a:tcPr/>
+                </a:tc>
+                <a:tc>
+                  <a:txBody>
+                    <a:bodyPr/>
+                    <a:lstStyle/>
+                    <a:p>
+                      <a:r>
+                        <a:rPr lang="en-US" sz="1600" dirty="0" err="1" smtClean="0">
+                          <a:latin typeface="Calibri" panose="020F0502020204030204" pitchFamily="34" charset="0"/>
+                        </a:rPr>
+                        <a:t>T_R_a</a:t>
+                      </a:r>
+                      <a:endParaRPr lang="en-CA" sz="1600" dirty="0">
+                        <a:latin typeface="Calibri" panose="020F0502020204030204" pitchFamily="34" charset="0"/>
+                      </a:endParaRPr>
+                    </a:p>
+                  </a:txBody>
+                  <a:tcPr/>
+                </a:tc>
+              </a:tr>
+              <a:tr h="331924">
+                <a:tc>
+                  <a:txBody>
+                    <a:bodyPr/>
+                    <a:lstStyle/>
+                    <a:p>
+                      <a:pPr algn="ctr"/>
+                      <a:r>
+                        <a:rPr lang="en-US" sz="1600" dirty="0" smtClean="0">
+                          <a:latin typeface="Calibri" panose="020F0502020204030204" pitchFamily="34" charset="0"/>
+                        </a:rPr>
+                        <a:t>2</a:t>
+                      </a:r>
+                      <a:endParaRPr lang="en-CA" sz="1600" dirty="0">
+                        <a:latin typeface="Calibri" panose="020F0502020204030204" pitchFamily="34" charset="0"/>
+                      </a:endParaRPr>
+                    </a:p>
+                  </a:txBody>
+                  <a:tcPr/>
+                </a:tc>
+                <a:tc>
+                  <a:txBody>
+                    <a:bodyPr/>
+                    <a:lstStyle/>
+                    <a:p>
+                      <a:pPr algn="ctr"/>
+                      <a:r>
+                        <a:rPr lang="en-US" sz="1600" dirty="0" smtClean="0">
+                          <a:latin typeface="Calibri" panose="020F0502020204030204" pitchFamily="34" charset="0"/>
+                        </a:rPr>
+                        <a:t>300</a:t>
+                      </a:r>
+                      <a:endParaRPr lang="en-CA" sz="1600" dirty="0">
+                        <a:latin typeface="Calibri" panose="020F0502020204030204" pitchFamily="34" charset="0"/>
+                      </a:endParaRPr>
+                    </a:p>
+                  </a:txBody>
+                  <a:tcPr/>
+                </a:tc>
+              </a:tr>
+            </a:tbl>
+          </a:graphicData>
+        </a:graphic>
+      </p:graphicFrame>
+      <p:sp>
+        <p:nvSpPr>
+          <p:cNvPr id="18" name="TextBox 17"/>
+          <p:cNvSpPr txBox="1"/>
+          <p:nvPr/>
+        </p:nvSpPr>
+        <p:spPr>
+          <a:xfrm>
+            <a:off x="7465462" y="3881581"/>
+            <a:ext cx="720080" cy="338554"/>
+          </a:xfrm>
+          <a:prstGeom prst="rect">
+            <a:avLst/>
+          </a:prstGeom>
+          <a:noFill/>
+        </p:spPr>
+        <p:txBody>
+          <a:bodyPr wrap="square" rtlCol="0">
+            <a:spAutoFit/>
+          </a:bodyPr>
+          <a:lstStyle/>
+          <a:p>
+            <a:r>
+              <a:rPr lang="en-US" sz="1600" b="1" dirty="0" smtClean="0">
+                <a:latin typeface="Calibri" panose="020F0502020204030204" pitchFamily="34" charset="0"/>
+              </a:rPr>
+              <a:t>Result</a:t>
+            </a:r>
+            <a:endParaRPr lang="en-CA" sz="1600" b="1" dirty="0">
+              <a:latin typeface="Calibri" panose="020F0502020204030204" pitchFamily="34" charset="0"/>
+            </a:endParaRPr>
+          </a:p>
+        </p:txBody>
+      </p:sp>
     </p:spTree>
     <p:extLst>
       <p:ext uri="{BB962C8B-B14F-4D97-AF65-F5344CB8AC3E}">
@@ -10719,9 +11533,884 @@
   <p:timing>
     <p:tnLst>
       <p:par>
-        <p:cTn id="1" dur="indefinite" restart="never" nodeType="tmRoot"/>
+        <p:cTn id="1" dur="indefinite" restart="never" nodeType="tmRoot">
+          <p:childTnLst>
+            <p:seq concurrent="1" nextAc="seek">
+              <p:cTn id="2" dur="indefinite" nodeType="mainSeq">
+                <p:childTnLst>
+                  <p:par>
+                    <p:cTn id="3" fill="hold">
+                      <p:stCondLst>
+                        <p:cond delay="indefinite"/>
+                      </p:stCondLst>
+                      <p:childTnLst>
+                        <p:par>
+                          <p:cTn id="4" fill="hold">
+                            <p:stCondLst>
+                              <p:cond delay="0"/>
+                            </p:stCondLst>
+                            <p:childTnLst>
+                              <p:par>
+                                <p:cTn id="5" presetID="6" presetClass="entr" presetSubtype="16" fill="hold" grpId="0" nodeType="clickEffect">
+                                  <p:stCondLst>
+                                    <p:cond delay="0"/>
+                                  </p:stCondLst>
+                                  <p:childTnLst>
+                                    <p:set>
+                                      <p:cBhvr>
+                                        <p:cTn id="6" dur="1" fill="hold">
+                                          <p:stCondLst>
+                                            <p:cond delay="0"/>
+                                          </p:stCondLst>
+                                        </p:cTn>
+                                        <p:tgtEl>
+                                          <p:spTgt spid="10"/>
+                                        </p:tgtEl>
+                                        <p:attrNameLst>
+                                          <p:attrName>style.visibility</p:attrName>
+                                        </p:attrNameLst>
+                                      </p:cBhvr>
+                                      <p:to>
+                                        <p:strVal val="visible"/>
+                                      </p:to>
+                                    </p:set>
+                                    <p:animEffect transition="in" filter="circle(in)">
+                                      <p:cBhvr>
+                                        <p:cTn id="7" dur="2000"/>
+                                        <p:tgtEl>
+                                          <p:spTgt spid="10"/>
+                                        </p:tgtEl>
+                                      </p:cBhvr>
+                                    </p:animEffect>
+                                  </p:childTnLst>
+                                </p:cTn>
+                              </p:par>
+                            </p:childTnLst>
+                          </p:cTn>
+                        </p:par>
+                      </p:childTnLst>
+                    </p:cTn>
+                  </p:par>
+                  <p:par>
+                    <p:cTn id="8" fill="hold">
+                      <p:stCondLst>
+                        <p:cond delay="indefinite"/>
+                      </p:stCondLst>
+                      <p:childTnLst>
+                        <p:par>
+                          <p:cTn id="9" fill="hold">
+                            <p:stCondLst>
+                              <p:cond delay="0"/>
+                            </p:stCondLst>
+                            <p:childTnLst>
+                              <p:par>
+                                <p:cTn id="10" presetID="42" presetClass="entr" presetSubtype="0" fill="hold" grpId="0" nodeType="clickEffect">
+                                  <p:stCondLst>
+                                    <p:cond delay="0"/>
+                                  </p:stCondLst>
+                                  <p:childTnLst>
+                                    <p:set>
+                                      <p:cBhvr>
+                                        <p:cTn id="11" dur="1" fill="hold">
+                                          <p:stCondLst>
+                                            <p:cond delay="0"/>
+                                          </p:stCondLst>
+                                        </p:cTn>
+                                        <p:tgtEl>
+                                          <p:spTgt spid="13"/>
+                                        </p:tgtEl>
+                                        <p:attrNameLst>
+                                          <p:attrName>style.visibility</p:attrName>
+                                        </p:attrNameLst>
+                                      </p:cBhvr>
+                                      <p:to>
+                                        <p:strVal val="visible"/>
+                                      </p:to>
+                                    </p:set>
+                                    <p:animEffect transition="in" filter="fade">
+                                      <p:cBhvr>
+                                        <p:cTn id="12" dur="1250"/>
+                                        <p:tgtEl>
+                                          <p:spTgt spid="13"/>
+                                        </p:tgtEl>
+                                      </p:cBhvr>
+                                    </p:animEffect>
+                                    <p:anim calcmode="lin" valueType="num">
+                                      <p:cBhvr>
+                                        <p:cTn id="13" dur="1250" fill="hold"/>
+                                        <p:tgtEl>
+                                          <p:spTgt spid="13"/>
+                                        </p:tgtEl>
+                                        <p:attrNameLst>
+                                          <p:attrName>ppt_x</p:attrName>
+                                        </p:attrNameLst>
+                                      </p:cBhvr>
+                                      <p:tavLst>
+                                        <p:tav tm="0">
+                                          <p:val>
+                                            <p:strVal val="#ppt_x"/>
+                                          </p:val>
+                                        </p:tav>
+                                        <p:tav tm="100000">
+                                          <p:val>
+                                            <p:strVal val="#ppt_x"/>
+                                          </p:val>
+                                        </p:tav>
+                                      </p:tavLst>
+                                    </p:anim>
+                                    <p:anim calcmode="lin" valueType="num">
+                                      <p:cBhvr>
+                                        <p:cTn id="14" dur="1250" fill="hold"/>
+                                        <p:tgtEl>
+                                          <p:spTgt spid="13"/>
+                                        </p:tgtEl>
+                                        <p:attrNameLst>
+                                          <p:attrName>ppt_y</p:attrName>
+                                        </p:attrNameLst>
+                                      </p:cBhvr>
+                                      <p:tavLst>
+                                        <p:tav tm="0">
+                                          <p:val>
+                                            <p:strVal val="#ppt_y+.1"/>
+                                          </p:val>
+                                        </p:tav>
+                                        <p:tav tm="100000">
+                                          <p:val>
+                                            <p:strVal val="#ppt_y"/>
+                                          </p:val>
+                                        </p:tav>
+                                      </p:tavLst>
+                                    </p:anim>
+                                  </p:childTnLst>
+                                </p:cTn>
+                              </p:par>
+                            </p:childTnLst>
+                          </p:cTn>
+                        </p:par>
+                      </p:childTnLst>
+                    </p:cTn>
+                  </p:par>
+                  <p:par>
+                    <p:cTn id="15" fill="hold">
+                      <p:stCondLst>
+                        <p:cond delay="indefinite"/>
+                      </p:stCondLst>
+                      <p:childTnLst>
+                        <p:par>
+                          <p:cTn id="16" fill="hold">
+                            <p:stCondLst>
+                              <p:cond delay="0"/>
+                            </p:stCondLst>
+                            <p:childTnLst>
+                              <p:par>
+                                <p:cTn id="17" presetID="42" presetClass="entr" presetSubtype="0" fill="hold" nodeType="clickEffect">
+                                  <p:stCondLst>
+                                    <p:cond delay="0"/>
+                                  </p:stCondLst>
+                                  <p:childTnLst>
+                                    <p:set>
+                                      <p:cBhvr>
+                                        <p:cTn id="18" dur="1" fill="hold">
+                                          <p:stCondLst>
+                                            <p:cond delay="0"/>
+                                          </p:stCondLst>
+                                        </p:cTn>
+                                        <p:tgtEl>
+                                          <p:spTgt spid="12"/>
+                                        </p:tgtEl>
+                                        <p:attrNameLst>
+                                          <p:attrName>style.visibility</p:attrName>
+                                        </p:attrNameLst>
+                                      </p:cBhvr>
+                                      <p:to>
+                                        <p:strVal val="visible"/>
+                                      </p:to>
+                                    </p:set>
+                                    <p:animEffect transition="in" filter="fade">
+                                      <p:cBhvr>
+                                        <p:cTn id="19" dur="1000"/>
+                                        <p:tgtEl>
+                                          <p:spTgt spid="12"/>
+                                        </p:tgtEl>
+                                      </p:cBhvr>
+                                    </p:animEffect>
+                                    <p:anim calcmode="lin" valueType="num">
+                                      <p:cBhvr>
+                                        <p:cTn id="20" dur="1000" fill="hold"/>
+                                        <p:tgtEl>
+                                          <p:spTgt spid="12"/>
+                                        </p:tgtEl>
+                                        <p:attrNameLst>
+                                          <p:attrName>ppt_x</p:attrName>
+                                        </p:attrNameLst>
+                                      </p:cBhvr>
+                                      <p:tavLst>
+                                        <p:tav tm="0">
+                                          <p:val>
+                                            <p:strVal val="#ppt_x"/>
+                                          </p:val>
+                                        </p:tav>
+                                        <p:tav tm="100000">
+                                          <p:val>
+                                            <p:strVal val="#ppt_x"/>
+                                          </p:val>
+                                        </p:tav>
+                                      </p:tavLst>
+                                    </p:anim>
+                                    <p:anim calcmode="lin" valueType="num">
+                                      <p:cBhvr>
+                                        <p:cTn id="21" dur="1000" fill="hold"/>
+                                        <p:tgtEl>
+                                          <p:spTgt spid="12"/>
+                                        </p:tgtEl>
+                                        <p:attrNameLst>
+                                          <p:attrName>ppt_y</p:attrName>
+                                        </p:attrNameLst>
+                                      </p:cBhvr>
+                                      <p:tavLst>
+                                        <p:tav tm="0">
+                                          <p:val>
+                                            <p:strVal val="#ppt_y+.1"/>
+                                          </p:val>
+                                        </p:tav>
+                                        <p:tav tm="100000">
+                                          <p:val>
+                                            <p:strVal val="#ppt_y"/>
+                                          </p:val>
+                                        </p:tav>
+                                      </p:tavLst>
+                                    </p:anim>
+                                  </p:childTnLst>
+                                </p:cTn>
+                              </p:par>
+                            </p:childTnLst>
+                          </p:cTn>
+                        </p:par>
+                      </p:childTnLst>
+                    </p:cTn>
+                  </p:par>
+                  <p:par>
+                    <p:cTn id="22" fill="hold">
+                      <p:stCondLst>
+                        <p:cond delay="indefinite"/>
+                      </p:stCondLst>
+                      <p:childTnLst>
+                        <p:par>
+                          <p:cTn id="23" fill="hold">
+                            <p:stCondLst>
+                              <p:cond delay="0"/>
+                            </p:stCondLst>
+                            <p:childTnLst>
+                              <p:par>
+                                <p:cTn id="24" presetID="42" presetClass="entr" presetSubtype="0" fill="hold" grpId="0" nodeType="clickEffect">
+                                  <p:stCondLst>
+                                    <p:cond delay="0"/>
+                                  </p:stCondLst>
+                                  <p:childTnLst>
+                                    <p:set>
+                                      <p:cBhvr>
+                                        <p:cTn id="25" dur="1" fill="hold">
+                                          <p:stCondLst>
+                                            <p:cond delay="0"/>
+                                          </p:stCondLst>
+                                        </p:cTn>
+                                        <p:tgtEl>
+                                          <p:spTgt spid="15"/>
+                                        </p:tgtEl>
+                                        <p:attrNameLst>
+                                          <p:attrName>style.visibility</p:attrName>
+                                        </p:attrNameLst>
+                                      </p:cBhvr>
+                                      <p:to>
+                                        <p:strVal val="visible"/>
+                                      </p:to>
+                                    </p:set>
+                                    <p:animEffect transition="in" filter="fade">
+                                      <p:cBhvr>
+                                        <p:cTn id="26" dur="1000"/>
+                                        <p:tgtEl>
+                                          <p:spTgt spid="15"/>
+                                        </p:tgtEl>
+                                      </p:cBhvr>
+                                    </p:animEffect>
+                                    <p:anim calcmode="lin" valueType="num">
+                                      <p:cBhvr>
+                                        <p:cTn id="27" dur="1000" fill="hold"/>
+                                        <p:tgtEl>
+                                          <p:spTgt spid="15"/>
+                                        </p:tgtEl>
+                                        <p:attrNameLst>
+                                          <p:attrName>ppt_x</p:attrName>
+                                        </p:attrNameLst>
+                                      </p:cBhvr>
+                                      <p:tavLst>
+                                        <p:tav tm="0">
+                                          <p:val>
+                                            <p:strVal val="#ppt_x"/>
+                                          </p:val>
+                                        </p:tav>
+                                        <p:tav tm="100000">
+                                          <p:val>
+                                            <p:strVal val="#ppt_x"/>
+                                          </p:val>
+                                        </p:tav>
+                                      </p:tavLst>
+                                    </p:anim>
+                                    <p:anim calcmode="lin" valueType="num">
+                                      <p:cBhvr>
+                                        <p:cTn id="28" dur="1000" fill="hold"/>
+                                        <p:tgtEl>
+                                          <p:spTgt spid="15"/>
+                                        </p:tgtEl>
+                                        <p:attrNameLst>
+                                          <p:attrName>ppt_y</p:attrName>
+                                        </p:attrNameLst>
+                                      </p:cBhvr>
+                                      <p:tavLst>
+                                        <p:tav tm="0">
+                                          <p:val>
+                                            <p:strVal val="#ppt_y+.1"/>
+                                          </p:val>
+                                        </p:tav>
+                                        <p:tav tm="100000">
+                                          <p:val>
+                                            <p:strVal val="#ppt_y"/>
+                                          </p:val>
+                                        </p:tav>
+                                      </p:tavLst>
+                                    </p:anim>
+                                  </p:childTnLst>
+                                </p:cTn>
+                              </p:par>
+                            </p:childTnLst>
+                          </p:cTn>
+                        </p:par>
+                      </p:childTnLst>
+                    </p:cTn>
+                  </p:par>
+                  <p:par>
+                    <p:cTn id="29" fill="hold">
+                      <p:stCondLst>
+                        <p:cond delay="indefinite"/>
+                      </p:stCondLst>
+                      <p:childTnLst>
+                        <p:par>
+                          <p:cTn id="30" fill="hold">
+                            <p:stCondLst>
+                              <p:cond delay="0"/>
+                            </p:stCondLst>
+                            <p:childTnLst>
+                              <p:par>
+                                <p:cTn id="31" presetID="42" presetClass="entr" presetSubtype="0" fill="hold" nodeType="clickEffect">
+                                  <p:stCondLst>
+                                    <p:cond delay="0"/>
+                                  </p:stCondLst>
+                                  <p:childTnLst>
+                                    <p:set>
+                                      <p:cBhvr>
+                                        <p:cTn id="32" dur="1" fill="hold">
+                                          <p:stCondLst>
+                                            <p:cond delay="0"/>
+                                          </p:stCondLst>
+                                        </p:cTn>
+                                        <p:tgtEl>
+                                          <p:spTgt spid="14"/>
+                                        </p:tgtEl>
+                                        <p:attrNameLst>
+                                          <p:attrName>style.visibility</p:attrName>
+                                        </p:attrNameLst>
+                                      </p:cBhvr>
+                                      <p:to>
+                                        <p:strVal val="visible"/>
+                                      </p:to>
+                                    </p:set>
+                                    <p:animEffect transition="in" filter="fade">
+                                      <p:cBhvr>
+                                        <p:cTn id="33" dur="1000"/>
+                                        <p:tgtEl>
+                                          <p:spTgt spid="14"/>
+                                        </p:tgtEl>
+                                      </p:cBhvr>
+                                    </p:animEffect>
+                                    <p:anim calcmode="lin" valueType="num">
+                                      <p:cBhvr>
+                                        <p:cTn id="34" dur="1000" fill="hold"/>
+                                        <p:tgtEl>
+                                          <p:spTgt spid="14"/>
+                                        </p:tgtEl>
+                                        <p:attrNameLst>
+                                          <p:attrName>ppt_x</p:attrName>
+                                        </p:attrNameLst>
+                                      </p:cBhvr>
+                                      <p:tavLst>
+                                        <p:tav tm="0">
+                                          <p:val>
+                                            <p:strVal val="#ppt_x"/>
+                                          </p:val>
+                                        </p:tav>
+                                        <p:tav tm="100000">
+                                          <p:val>
+                                            <p:strVal val="#ppt_x"/>
+                                          </p:val>
+                                        </p:tav>
+                                      </p:tavLst>
+                                    </p:anim>
+                                    <p:anim calcmode="lin" valueType="num">
+                                      <p:cBhvr>
+                                        <p:cTn id="35" dur="1000" fill="hold"/>
+                                        <p:tgtEl>
+                                          <p:spTgt spid="14"/>
+                                        </p:tgtEl>
+                                        <p:attrNameLst>
+                                          <p:attrName>ppt_y</p:attrName>
+                                        </p:attrNameLst>
+                                      </p:cBhvr>
+                                      <p:tavLst>
+                                        <p:tav tm="0">
+                                          <p:val>
+                                            <p:strVal val="#ppt_y+.1"/>
+                                          </p:val>
+                                        </p:tav>
+                                        <p:tav tm="100000">
+                                          <p:val>
+                                            <p:strVal val="#ppt_y"/>
+                                          </p:val>
+                                        </p:tav>
+                                      </p:tavLst>
+                                    </p:anim>
+                                  </p:childTnLst>
+                                </p:cTn>
+                              </p:par>
+                            </p:childTnLst>
+                          </p:cTn>
+                        </p:par>
+                      </p:childTnLst>
+                    </p:cTn>
+                  </p:par>
+                  <p:par>
+                    <p:cTn id="36" fill="hold">
+                      <p:stCondLst>
+                        <p:cond delay="indefinite"/>
+                      </p:stCondLst>
+                      <p:childTnLst>
+                        <p:par>
+                          <p:cTn id="37" fill="hold">
+                            <p:stCondLst>
+                              <p:cond delay="0"/>
+                            </p:stCondLst>
+                            <p:childTnLst>
+                              <p:par>
+                                <p:cTn id="38" presetID="42" presetClass="entr" presetSubtype="0" fill="hold" grpId="0" nodeType="clickEffect">
+                                  <p:stCondLst>
+                                    <p:cond delay="0"/>
+                                  </p:stCondLst>
+                                  <p:childTnLst>
+                                    <p:set>
+                                      <p:cBhvr>
+                                        <p:cTn id="39" dur="1" fill="hold">
+                                          <p:stCondLst>
+                                            <p:cond delay="0"/>
+                                          </p:stCondLst>
+                                        </p:cTn>
+                                        <p:tgtEl>
+                                          <p:spTgt spid="17"/>
+                                        </p:tgtEl>
+                                        <p:attrNameLst>
+                                          <p:attrName>style.visibility</p:attrName>
+                                        </p:attrNameLst>
+                                      </p:cBhvr>
+                                      <p:to>
+                                        <p:strVal val="visible"/>
+                                      </p:to>
+                                    </p:set>
+                                    <p:animEffect transition="in" filter="fade">
+                                      <p:cBhvr>
+                                        <p:cTn id="40" dur="1000"/>
+                                        <p:tgtEl>
+                                          <p:spTgt spid="17"/>
+                                        </p:tgtEl>
+                                      </p:cBhvr>
+                                    </p:animEffect>
+                                    <p:anim calcmode="lin" valueType="num">
+                                      <p:cBhvr>
+                                        <p:cTn id="41" dur="1000" fill="hold"/>
+                                        <p:tgtEl>
+                                          <p:spTgt spid="17"/>
+                                        </p:tgtEl>
+                                        <p:attrNameLst>
+                                          <p:attrName>ppt_x</p:attrName>
+                                        </p:attrNameLst>
+                                      </p:cBhvr>
+                                      <p:tavLst>
+                                        <p:tav tm="0">
+                                          <p:val>
+                                            <p:strVal val="#ppt_x"/>
+                                          </p:val>
+                                        </p:tav>
+                                        <p:tav tm="100000">
+                                          <p:val>
+                                            <p:strVal val="#ppt_x"/>
+                                          </p:val>
+                                        </p:tav>
+                                      </p:tavLst>
+                                    </p:anim>
+                                    <p:anim calcmode="lin" valueType="num">
+                                      <p:cBhvr>
+                                        <p:cTn id="42" dur="1000" fill="hold"/>
+                                        <p:tgtEl>
+                                          <p:spTgt spid="17"/>
+                                        </p:tgtEl>
+                                        <p:attrNameLst>
+                                          <p:attrName>ppt_y</p:attrName>
+                                        </p:attrNameLst>
+                                      </p:cBhvr>
+                                      <p:tavLst>
+                                        <p:tav tm="0">
+                                          <p:val>
+                                            <p:strVal val="#ppt_y+.1"/>
+                                          </p:val>
+                                        </p:tav>
+                                        <p:tav tm="100000">
+                                          <p:val>
+                                            <p:strVal val="#ppt_y"/>
+                                          </p:val>
+                                        </p:tav>
+                                      </p:tavLst>
+                                    </p:anim>
+                                  </p:childTnLst>
+                                </p:cTn>
+                              </p:par>
+                            </p:childTnLst>
+                          </p:cTn>
+                        </p:par>
+                      </p:childTnLst>
+                    </p:cTn>
+                  </p:par>
+                  <p:par>
+                    <p:cTn id="43" fill="hold">
+                      <p:stCondLst>
+                        <p:cond delay="indefinite"/>
+                      </p:stCondLst>
+                      <p:childTnLst>
+                        <p:par>
+                          <p:cTn id="44" fill="hold">
+                            <p:stCondLst>
+                              <p:cond delay="0"/>
+                            </p:stCondLst>
+                            <p:childTnLst>
+                              <p:par>
+                                <p:cTn id="45" presetID="42" presetClass="entr" presetSubtype="0" fill="hold" nodeType="clickEffect">
+                                  <p:stCondLst>
+                                    <p:cond delay="0"/>
+                                  </p:stCondLst>
+                                  <p:childTnLst>
+                                    <p:set>
+                                      <p:cBhvr>
+                                        <p:cTn id="46" dur="1" fill="hold">
+                                          <p:stCondLst>
+                                            <p:cond delay="0"/>
+                                          </p:stCondLst>
+                                        </p:cTn>
+                                        <p:tgtEl>
+                                          <p:spTgt spid="16"/>
+                                        </p:tgtEl>
+                                        <p:attrNameLst>
+                                          <p:attrName>style.visibility</p:attrName>
+                                        </p:attrNameLst>
+                                      </p:cBhvr>
+                                      <p:to>
+                                        <p:strVal val="visible"/>
+                                      </p:to>
+                                    </p:set>
+                                    <p:animEffect transition="in" filter="fade">
+                                      <p:cBhvr>
+                                        <p:cTn id="47" dur="1000"/>
+                                        <p:tgtEl>
+                                          <p:spTgt spid="16"/>
+                                        </p:tgtEl>
+                                      </p:cBhvr>
+                                    </p:animEffect>
+                                    <p:anim calcmode="lin" valueType="num">
+                                      <p:cBhvr>
+                                        <p:cTn id="48" dur="1000" fill="hold"/>
+                                        <p:tgtEl>
+                                          <p:spTgt spid="16"/>
+                                        </p:tgtEl>
+                                        <p:attrNameLst>
+                                          <p:attrName>ppt_x</p:attrName>
+                                        </p:attrNameLst>
+                                      </p:cBhvr>
+                                      <p:tavLst>
+                                        <p:tav tm="0">
+                                          <p:val>
+                                            <p:strVal val="#ppt_x"/>
+                                          </p:val>
+                                        </p:tav>
+                                        <p:tav tm="100000">
+                                          <p:val>
+                                            <p:strVal val="#ppt_x"/>
+                                          </p:val>
+                                        </p:tav>
+                                      </p:tavLst>
+                                    </p:anim>
+                                    <p:anim calcmode="lin" valueType="num">
+                                      <p:cBhvr>
+                                        <p:cTn id="49" dur="1000" fill="hold"/>
+                                        <p:tgtEl>
+                                          <p:spTgt spid="16"/>
+                                        </p:tgtEl>
+                                        <p:attrNameLst>
+                                          <p:attrName>ppt_y</p:attrName>
+                                        </p:attrNameLst>
+                                      </p:cBhvr>
+                                      <p:tavLst>
+                                        <p:tav tm="0">
+                                          <p:val>
+                                            <p:strVal val="#ppt_y+.1"/>
+                                          </p:val>
+                                        </p:tav>
+                                        <p:tav tm="100000">
+                                          <p:val>
+                                            <p:strVal val="#ppt_y"/>
+                                          </p:val>
+                                        </p:tav>
+                                      </p:tavLst>
+                                    </p:anim>
+                                  </p:childTnLst>
+                                </p:cTn>
+                              </p:par>
+                            </p:childTnLst>
+                          </p:cTn>
+                        </p:par>
+                      </p:childTnLst>
+                    </p:cTn>
+                  </p:par>
+                  <p:par>
+                    <p:cTn id="50" fill="hold">
+                      <p:stCondLst>
+                        <p:cond delay="indefinite"/>
+                      </p:stCondLst>
+                      <p:childTnLst>
+                        <p:par>
+                          <p:cTn id="51" fill="hold">
+                            <p:stCondLst>
+                              <p:cond delay="0"/>
+                            </p:stCondLst>
+                            <p:childTnLst>
+                              <p:par>
+                                <p:cTn id="52" presetID="42" presetClass="entr" presetSubtype="0" fill="hold" grpId="0" nodeType="clickEffect">
+                                  <p:stCondLst>
+                                    <p:cond delay="0"/>
+                                  </p:stCondLst>
+                                  <p:childTnLst>
+                                    <p:set>
+                                      <p:cBhvr>
+                                        <p:cTn id="53" dur="1" fill="hold">
+                                          <p:stCondLst>
+                                            <p:cond delay="0"/>
+                                          </p:stCondLst>
+                                        </p:cTn>
+                                        <p:tgtEl>
+                                          <p:spTgt spid="18"/>
+                                        </p:tgtEl>
+                                        <p:attrNameLst>
+                                          <p:attrName>style.visibility</p:attrName>
+                                        </p:attrNameLst>
+                                      </p:cBhvr>
+                                      <p:to>
+                                        <p:strVal val="visible"/>
+                                      </p:to>
+                                    </p:set>
+                                    <p:animEffect transition="in" filter="fade">
+                                      <p:cBhvr>
+                                        <p:cTn id="54" dur="1000"/>
+                                        <p:tgtEl>
+                                          <p:spTgt spid="18"/>
+                                        </p:tgtEl>
+                                      </p:cBhvr>
+                                    </p:animEffect>
+                                    <p:anim calcmode="lin" valueType="num">
+                                      <p:cBhvr>
+                                        <p:cTn id="55" dur="1000" fill="hold"/>
+                                        <p:tgtEl>
+                                          <p:spTgt spid="18"/>
+                                        </p:tgtEl>
+                                        <p:attrNameLst>
+                                          <p:attrName>ppt_x</p:attrName>
+                                        </p:attrNameLst>
+                                      </p:cBhvr>
+                                      <p:tavLst>
+                                        <p:tav tm="0">
+                                          <p:val>
+                                            <p:strVal val="#ppt_x"/>
+                                          </p:val>
+                                        </p:tav>
+                                        <p:tav tm="100000">
+                                          <p:val>
+                                            <p:strVal val="#ppt_x"/>
+                                          </p:val>
+                                        </p:tav>
+                                      </p:tavLst>
+                                    </p:anim>
+                                    <p:anim calcmode="lin" valueType="num">
+                                      <p:cBhvr>
+                                        <p:cTn id="56" dur="1000" fill="hold"/>
+                                        <p:tgtEl>
+                                          <p:spTgt spid="18"/>
+                                        </p:tgtEl>
+                                        <p:attrNameLst>
+                                          <p:attrName>ppt_y</p:attrName>
+                                        </p:attrNameLst>
+                                      </p:cBhvr>
+                                      <p:tavLst>
+                                        <p:tav tm="0">
+                                          <p:val>
+                                            <p:strVal val="#ppt_y+.1"/>
+                                          </p:val>
+                                        </p:tav>
+                                        <p:tav tm="100000">
+                                          <p:val>
+                                            <p:strVal val="#ppt_y"/>
+                                          </p:val>
+                                        </p:tav>
+                                      </p:tavLst>
+                                    </p:anim>
+                                  </p:childTnLst>
+                                </p:cTn>
+                              </p:par>
+                            </p:childTnLst>
+                          </p:cTn>
+                        </p:par>
+                      </p:childTnLst>
+                    </p:cTn>
+                  </p:par>
+                  <p:par>
+                    <p:cTn id="57" fill="hold">
+                      <p:stCondLst>
+                        <p:cond delay="indefinite"/>
+                      </p:stCondLst>
+                      <p:childTnLst>
+                        <p:par>
+                          <p:cTn id="58" fill="hold">
+                            <p:stCondLst>
+                              <p:cond delay="0"/>
+                            </p:stCondLst>
+                            <p:childTnLst>
+                              <p:par>
+                                <p:cTn id="59" presetID="42" presetClass="entr" presetSubtype="0" fill="hold" nodeType="clickEffect">
+                                  <p:stCondLst>
+                                    <p:cond delay="0"/>
+                                  </p:stCondLst>
+                                  <p:childTnLst>
+                                    <p:set>
+                                      <p:cBhvr>
+                                        <p:cTn id="60" dur="1" fill="hold">
+                                          <p:stCondLst>
+                                            <p:cond delay="0"/>
+                                          </p:stCondLst>
+                                        </p:cTn>
+                                        <p:tgtEl>
+                                          <p:spTgt spid="2"/>
+                                        </p:tgtEl>
+                                        <p:attrNameLst>
+                                          <p:attrName>style.visibility</p:attrName>
+                                        </p:attrNameLst>
+                                      </p:cBhvr>
+                                      <p:to>
+                                        <p:strVal val="visible"/>
+                                      </p:to>
+                                    </p:set>
+                                    <p:animEffect transition="in" filter="fade">
+                                      <p:cBhvr>
+                                        <p:cTn id="61" dur="1000"/>
+                                        <p:tgtEl>
+                                          <p:spTgt spid="2"/>
+                                        </p:tgtEl>
+                                      </p:cBhvr>
+                                    </p:animEffect>
+                                    <p:anim calcmode="lin" valueType="num">
+                                      <p:cBhvr>
+                                        <p:cTn id="62" dur="1000" fill="hold"/>
+                                        <p:tgtEl>
+                                          <p:spTgt spid="2"/>
+                                        </p:tgtEl>
+                                        <p:attrNameLst>
+                                          <p:attrName>ppt_x</p:attrName>
+                                        </p:attrNameLst>
+                                      </p:cBhvr>
+                                      <p:tavLst>
+                                        <p:tav tm="0">
+                                          <p:val>
+                                            <p:strVal val="#ppt_x"/>
+                                          </p:val>
+                                        </p:tav>
+                                        <p:tav tm="100000">
+                                          <p:val>
+                                            <p:strVal val="#ppt_x"/>
+                                          </p:val>
+                                        </p:tav>
+                                      </p:tavLst>
+                                    </p:anim>
+                                    <p:anim calcmode="lin" valueType="num">
+                                      <p:cBhvr>
+                                        <p:cTn id="63" dur="1000" fill="hold"/>
+                                        <p:tgtEl>
+                                          <p:spTgt spid="2"/>
+                                        </p:tgtEl>
+                                        <p:attrNameLst>
+                                          <p:attrName>ppt_y</p:attrName>
+                                        </p:attrNameLst>
+                                      </p:cBhvr>
+                                      <p:tavLst>
+                                        <p:tav tm="0">
+                                          <p:val>
+                                            <p:strVal val="#ppt_y+.1"/>
+                                          </p:val>
+                                        </p:tav>
+                                        <p:tav tm="100000">
+                                          <p:val>
+                                            <p:strVal val="#ppt_y"/>
+                                          </p:val>
+                                        </p:tav>
+                                      </p:tavLst>
+                                    </p:anim>
+                                  </p:childTnLst>
+                                </p:cTn>
+                              </p:par>
+                            </p:childTnLst>
+                          </p:cTn>
+                        </p:par>
+                      </p:childTnLst>
+                    </p:cTn>
+                  </p:par>
+                </p:childTnLst>
+              </p:cTn>
+              <p:prevCondLst>
+                <p:cond evt="onPrev" delay="0">
+                  <p:tgtEl>
+                    <p:sldTgt/>
+                  </p:tgtEl>
+                </p:cond>
+              </p:prevCondLst>
+              <p:nextCondLst>
+                <p:cond evt="onNext" delay="0">
+                  <p:tgtEl>
+                    <p:sldTgt/>
+                  </p:tgtEl>
+                </p:cond>
+              </p:nextCondLst>
+            </p:seq>
+          </p:childTnLst>
+        </p:cTn>
       </p:par>
     </p:tnLst>
+    <p:bldLst>
+      <p:bldP spid="10" grpId="0"/>
+      <p:bldP spid="13" grpId="0"/>
+      <p:bldP spid="15" grpId="0"/>
+      <p:bldP spid="17" grpId="0"/>
+      <p:bldP spid="18" grpId="0"/>
+    </p:bldLst>
   </p:timing>
 </p:sld>
 </file>
@@ -10767,11 +12456,7 @@
           <a:p>
             <a:r>
               <a:rPr lang="en-US" dirty="0" smtClean="0"/>
-              <a:t>Provenance: Projection </a:t>
-            </a:r>
-            <a:r>
-              <a:rPr lang="en-US" dirty="0" smtClean="0"/>
-              <a:t>and Selection </a:t>
+              <a:t>Provenance: Projection and Selection </a:t>
             </a:r>
             <a:endParaRPr lang="en-CA" dirty="0"/>
           </a:p>
@@ -12457,6 +14142,36 @@
           </a:graphicData>
         </a:graphic>
       </p:graphicFrame>
+      <p:sp>
+        <p:nvSpPr>
+          <p:cNvPr id="5" name="TextBox 4"/>
+          <p:cNvSpPr txBox="1"/>
+          <p:nvPr/>
+        </p:nvSpPr>
+        <p:spPr>
+          <a:xfrm>
+            <a:off x="3707904" y="3645024"/>
+            <a:ext cx="1584176" cy="369332"/>
+          </a:xfrm>
+          <a:prstGeom prst="rect">
+            <a:avLst/>
+          </a:prstGeom>
+          <a:noFill/>
+        </p:spPr>
+        <p:txBody>
+          <a:bodyPr wrap="square" rtlCol="0">
+            <a:spAutoFit/>
+          </a:bodyPr>
+          <a:lstStyle/>
+          <a:p>
+            <a:r>
+              <a:rPr lang="en-US" dirty="0" smtClean="0"/>
+              <a:t>Projection</a:t>
+            </a:r>
+            <a:endParaRPr lang="en-CA" dirty="0"/>
+          </a:p>
+        </p:txBody>
+      </p:sp>
     </p:spTree>
     <p:extLst>
       <p:ext uri="{BB962C8B-B14F-4D97-AF65-F5344CB8AC3E}">
@@ -14444,11 +16159,7 @@
           <a:p>
             <a:r>
               <a:rPr lang="en-US" dirty="0" smtClean="0"/>
-              <a:t>Provenance: </a:t>
-            </a:r>
-            <a:r>
-              <a:rPr lang="en-US" dirty="0" smtClean="0"/>
-              <a:t> Complex Query</a:t>
+              <a:t>Provenance:  Complex Query</a:t>
             </a:r>
             <a:endParaRPr lang="en-CA" dirty="0"/>
           </a:p>
@@ -15628,8 +17339,8 @@
           </a:p>
         </p:txBody>
       </p:sp>
-      <mc:AlternateContent xmlns:mc="http://schemas.openxmlformats.org/markup-compatibility/2006">
-        <mc:Choice xmlns:a14="http://schemas.microsoft.com/office/drawing/2010/main" Requires="a14">
+      <mc:AlternateContent xmlns:mc="http://schemas.openxmlformats.org/markup-compatibility/2006" xmlns:a14="http://schemas.microsoft.com/office/drawing/2010/main">
+        <mc:Choice Requires="a14">
           <p:sp>
             <p:nvSpPr>
               <p:cNvPr id="11" name="TextBox 10"/>
@@ -15717,11 +17428,7 @@
                 </a:r>
                 <a:r>
                   <a:rPr lang="en-CA" baseline="-25000" dirty="0" smtClean="0"/>
-                  <a:t>(c=2</a:t>
-                </a:r>
-                <a:r>
-                  <a:rPr lang="en-CA" baseline="-25000" dirty="0" smtClean="0"/>
-                  <a:t>)</a:t>
+                  <a:t>(c=2)</a:t>
                 </a:r>
                 <a:r>
                   <a:rPr lang="en-CA" dirty="0" smtClean="0"/>
@@ -15733,11 +17440,7 @@
                 </a:r>
                 <a:r>
                   <a:rPr lang="en-US" dirty="0" smtClean="0"/>
-                  <a:t>  </a:t>
-                </a:r>
-                <a:r>
-                  <a:rPr lang="en-US" dirty="0" smtClean="0"/>
-                  <a:t>( T </a:t>
+                  <a:t>  ( T </a:t>
                 </a:r>
                 <a:r>
                   <a:rPr lang="en-US" dirty="0" smtClean="0">
@@ -15754,7 +17457,7 @@
             </p:txBody>
           </p:sp>
         </mc:Choice>
-        <mc:Fallback>
+        <mc:Fallback xmlns="">
           <p:sp>
             <p:nvSpPr>
               <p:cNvPr id="11" name="TextBox 10"/>
@@ -17218,11 +18921,7 @@
           <a:p>
             <a:r>
               <a:rPr lang="en-US" dirty="0" smtClean="0"/>
-              <a:t>Uncertain</a:t>
-            </a:r>
-            <a:r>
-              <a:rPr lang="en-US" dirty="0" smtClean="0"/>
-              <a:t>: Projection and Selection </a:t>
+              <a:t>Uncertain: Projection and Selection </a:t>
             </a:r>
             <a:endParaRPr lang="en-CA" dirty="0"/>
           </a:p>
@@ -21565,8 +23264,8 @@
           </a:p>
         </p:txBody>
       </p:sp>
-      <mc:AlternateContent xmlns:mc="http://schemas.openxmlformats.org/markup-compatibility/2006">
-        <mc:Choice xmlns:a14="http://schemas.microsoft.com/office/drawing/2010/main" Requires="a14">
+      <mc:AlternateContent xmlns:mc="http://schemas.openxmlformats.org/markup-compatibility/2006" xmlns:a14="http://schemas.microsoft.com/office/drawing/2010/main">
+        <mc:Choice Requires="a14">
           <p:sp>
             <p:nvSpPr>
               <p:cNvPr id="10" name="TextBox 9"/>
@@ -21662,19 +23361,11 @@
                 </a:r>
                 <a:r>
                   <a:rPr lang="en-CA" dirty="0" smtClean="0"/>
-                  <a:t> </a:t>
-                </a:r>
-                <a:r>
-                  <a:rPr lang="en-CA" dirty="0" smtClean="0"/>
-                  <a:t>S  ⋈ </a:t>
+                  <a:t> S  ⋈ </a:t>
                 </a:r>
                 <a:r>
                   <a:rPr lang="en-CA" baseline="-25000" dirty="0" smtClean="0"/>
-                  <a:t>(v=a</a:t>
-                </a:r>
-                <a:r>
-                  <a:rPr lang="en-CA" baseline="-25000" dirty="0" smtClean="0"/>
-                  <a:t>)</a:t>
+                  <a:t>(v=a)</a:t>
                 </a:r>
                 <a:r>
                   <a:rPr lang="en-US" dirty="0" smtClean="0"/>
@@ -21695,7 +23386,7 @@
             </p:txBody>
           </p:sp>
         </mc:Choice>
-        <mc:Fallback>
+        <mc:Fallback xmlns="">
           <p:sp>
             <p:nvSpPr>
               <p:cNvPr id="10" name="TextBox 9"/>

</xml_diff>